<commit_message>
updated PPs; new code
</commit_message>
<xml_diff>
--- a/presentations/DESY - Final Presentation.pptx
+++ b/presentations/DESY - Final Presentation.pptx
@@ -6,7 +6,7 @@
     <p:sldMasterId id="2147483661" r:id="rId2"/>
   </p:sldMasterIdLst>
   <p:notesMasterIdLst>
-    <p:notesMasterId r:id="rId10"/>
+    <p:notesMasterId r:id="rId18"/>
   </p:notesMasterIdLst>
   <p:sldIdLst>
     <p:sldId id="256" r:id="rId3"/>
@@ -15,7 +15,15 @@
     <p:sldId id="265" r:id="rId6"/>
     <p:sldId id="269" r:id="rId7"/>
     <p:sldId id="267" r:id="rId8"/>
-    <p:sldId id="268" r:id="rId9"/>
+    <p:sldId id="270" r:id="rId9"/>
+    <p:sldId id="277" r:id="rId10"/>
+    <p:sldId id="271" r:id="rId11"/>
+    <p:sldId id="272" r:id="rId12"/>
+    <p:sldId id="273" r:id="rId13"/>
+    <p:sldId id="276" r:id="rId14"/>
+    <p:sldId id="274" r:id="rId15"/>
+    <p:sldId id="275" r:id="rId16"/>
+    <p:sldId id="268" r:id="rId17"/>
   </p:sldIdLst>
   <p:sldSz cx="12192000" cy="6858000"/>
   <p:notesSz cx="6858000" cy="9144000"/>
@@ -6660,6 +6668,1263 @@
 </p:sld>
 </file>
 
+<file path=ppt/slides/slide10.xml><?xml version="1.0" encoding="utf-8"?>
+<p:sld xmlns:a="http://schemas.openxmlformats.org/drawingml/2006/main" xmlns:r="http://schemas.openxmlformats.org/officeDocument/2006/relationships" xmlns:p="http://schemas.openxmlformats.org/presentationml/2006/main">
+  <p:cSld>
+    <p:spTree>
+      <p:nvGrpSpPr>
+        <p:cNvPr id="1" name=""/>
+        <p:cNvGrpSpPr/>
+        <p:nvPr/>
+      </p:nvGrpSpPr>
+      <p:grpSpPr>
+        <a:xfrm>
+          <a:off x="0" y="0"/>
+          <a:ext cx="0" cy="0"/>
+          <a:chOff x="0" y="0"/>
+          <a:chExt cx="0" cy="0"/>
+        </a:xfrm>
+      </p:grpSpPr>
+      <mc:AlternateContent xmlns:mc="http://schemas.openxmlformats.org/markup-compatibility/2006">
+        <mc:Choice xmlns:a14="http://schemas.microsoft.com/office/drawing/2010/main" Requires="a14">
+          <p:sp>
+            <p:nvSpPr>
+              <p:cNvPr id="3" name="Content Placeholder 2">
+                <a:extLst>
+                  <a:ext uri="{FF2B5EF4-FFF2-40B4-BE49-F238E27FC236}">
+                    <a16:creationId xmlns:a16="http://schemas.microsoft.com/office/drawing/2014/main" id="{9B1ED538-F08C-9AE2-492D-F1F64E21920A}"/>
+                  </a:ext>
+                </a:extLst>
+              </p:cNvPr>
+              <p:cNvSpPr>
+                <a:spLocks noGrp="1"/>
+              </p:cNvSpPr>
+              <p:nvPr>
+                <p:ph/>
+              </p:nvPr>
+            </p:nvSpPr>
+            <p:spPr>
+              <a:xfrm>
+                <a:off x="407881" y="1406520"/>
+                <a:ext cx="5688120" cy="5009760"/>
+              </a:xfrm>
+            </p:spPr>
+            <p:txBody>
+              <a:bodyPr/>
+              <a:lstStyle/>
+              <a:p>
+                <a:r>
+                  <a:rPr lang="en-GB" dirty="0"/>
+                  <a:t>The simulations were used to investigate the effects of chirp (GVD) on the UV output spectra</a:t>
+                </a:r>
+              </a:p>
+              <a:p>
+                <a:pPr lvl="1"/>
+                <a:r>
+                  <a:rPr lang="en-GB" dirty="0"/>
+                  <a:t>The chosen GVD values of </a:t>
+                </a:r>
+                <a14:m>
+                  <m:oMath xmlns:m="http://schemas.openxmlformats.org/officeDocument/2006/math">
+                    <m:r>
+                      <a:rPr lang="en-GB" b="0" i="1" smtClean="0">
+                        <a:latin typeface="Cambria Math" panose="02040503050406030204" pitchFamily="18" charset="0"/>
+                      </a:rPr>
+                      <m:t>±</m:t>
+                    </m:r>
+                  </m:oMath>
+                </a14:m>
+                <a:r>
+                  <a:rPr lang="en-GB" dirty="0"/>
+                  <a:t>11.0fs² correspond to an input pulse stretched from 6.2fs to 9.Xfs </a:t>
+                </a:r>
+              </a:p>
+              <a:p>
+                <a:r>
+                  <a:rPr lang="en-GB" dirty="0"/>
+                  <a:t>Negative chirp increases UV intensity without introducing significant spectral broadening</a:t>
+                </a:r>
+              </a:p>
+              <a:p>
+                <a:r>
+                  <a:rPr lang="en-GB" dirty="0"/>
+                  <a:t>Positive chirp results in a broadened spectrum (towards the blue end)</a:t>
+                </a:r>
+              </a:p>
+            </p:txBody>
+          </p:sp>
+        </mc:Choice>
+        <mc:Fallback>
+          <p:sp>
+            <p:nvSpPr>
+              <p:cNvPr id="3" name="Content Placeholder 2">
+                <a:extLst>
+                  <a:ext uri="{FF2B5EF4-FFF2-40B4-BE49-F238E27FC236}">
+                    <a16:creationId xmlns:a16="http://schemas.microsoft.com/office/drawing/2014/main" id="{9B1ED538-F08C-9AE2-492D-F1F64E21920A}"/>
+                  </a:ext>
+                </a:extLst>
+              </p:cNvPr>
+              <p:cNvSpPr>
+                <a:spLocks noGrp="1" noRot="1" noChangeAspect="1" noMove="1" noResize="1" noEditPoints="1" noAdjustHandles="1" noChangeArrowheads="1" noChangeShapeType="1" noTextEdit="1"/>
+              </p:cNvSpPr>
+              <p:nvPr>
+                <p:ph/>
+              </p:nvPr>
+            </p:nvSpPr>
+            <p:spPr>
+              <a:xfrm>
+                <a:off x="407881" y="1406520"/>
+                <a:ext cx="5688120" cy="5009760"/>
+              </a:xfrm>
+              <a:blipFill>
+                <a:blip r:embed="rId2"/>
+                <a:stretch>
+                  <a:fillRect l="-3537" t="-3041" r="-3215"/>
+                </a:stretch>
+              </a:blipFill>
+            </p:spPr>
+            <p:txBody>
+              <a:bodyPr/>
+              <a:lstStyle/>
+              <a:p>
+                <a:r>
+                  <a:rPr lang="en-GB">
+                    <a:noFill/>
+                  </a:rPr>
+                  <a:t> </a:t>
+                </a:r>
+              </a:p>
+            </p:txBody>
+          </p:sp>
+        </mc:Fallback>
+      </mc:AlternateContent>
+      <p:sp>
+        <p:nvSpPr>
+          <p:cNvPr id="4" name="Footer Placeholder 3">
+            <a:extLst>
+              <a:ext uri="{FF2B5EF4-FFF2-40B4-BE49-F238E27FC236}">
+                <a16:creationId xmlns:a16="http://schemas.microsoft.com/office/drawing/2014/main" id="{D1E01C6D-F22D-D24A-1865-1D82F00CE0FE}"/>
+              </a:ext>
+            </a:extLst>
+          </p:cNvPr>
+          <p:cNvSpPr>
+            <a:spLocks noGrp="1"/>
+          </p:cNvSpPr>
+          <p:nvPr>
+            <p:ph type="ftr" idx="1"/>
+          </p:nvPr>
+        </p:nvSpPr>
+        <p:spPr/>
+        <p:txBody>
+          <a:bodyPr/>
+          <a:lstStyle/>
+          <a:p>
+            <a:r>
+              <a:rPr lang="en-GB"/>
+              <a:t>| Project Presentation | David Amorim, 04.09.2023 </a:t>
+            </a:r>
+          </a:p>
+        </p:txBody>
+      </p:sp>
+      <p:sp>
+        <p:nvSpPr>
+          <p:cNvPr id="5" name="Title 4">
+            <a:extLst>
+              <a:ext uri="{FF2B5EF4-FFF2-40B4-BE49-F238E27FC236}">
+                <a16:creationId xmlns:a16="http://schemas.microsoft.com/office/drawing/2014/main" id="{D5A32016-864B-49D6-96FD-63CE725EAE57}"/>
+              </a:ext>
+            </a:extLst>
+          </p:cNvPr>
+          <p:cNvSpPr>
+            <a:spLocks noGrp="1"/>
+          </p:cNvSpPr>
+          <p:nvPr>
+            <p:ph type="title"/>
+          </p:nvPr>
+        </p:nvSpPr>
+        <p:spPr>
+          <a:xfrm>
+            <a:off x="407520" y="313920"/>
+            <a:ext cx="9968400" cy="450720"/>
+          </a:xfrm>
+        </p:spPr>
+        <p:txBody>
+          <a:bodyPr/>
+          <a:lstStyle/>
+          <a:p>
+            <a:r>
+              <a:rPr lang="en-US" b="1" spc="-1" dirty="0">
+                <a:solidFill>
+                  <a:srgbClr val="009FDF"/>
+                </a:solidFill>
+                <a:latin typeface="Arial"/>
+              </a:rPr>
+              <a:t>4.III Effects of chirp</a:t>
+            </a:r>
+            <a:endParaRPr lang="en-GB" dirty="0"/>
+          </a:p>
+        </p:txBody>
+      </p:sp>
+      <p:pic>
+        <p:nvPicPr>
+          <p:cNvPr id="7" name="Picture 6" descr="A graph of a graph of a graph&#10;&#10;Description automatically generated with medium confidence">
+            <a:extLst>
+              <a:ext uri="{FF2B5EF4-FFF2-40B4-BE49-F238E27FC236}">
+                <a16:creationId xmlns:a16="http://schemas.microsoft.com/office/drawing/2014/main" id="{05989DCA-718B-FC43-832F-36458D8EE733}"/>
+              </a:ext>
+            </a:extLst>
+          </p:cNvPr>
+          <p:cNvPicPr>
+            <a:picLocks noChangeAspect="1"/>
+          </p:cNvPicPr>
+          <p:nvPr/>
+        </p:nvPicPr>
+        <p:blipFill>
+          <a:blip r:embed="rId3" cstate="print">
+            <a:extLst>
+              <a:ext uri="{28A0092B-C50C-407E-A947-70E740481C1C}">
+                <a14:useLocalDpi xmlns:a14="http://schemas.microsoft.com/office/drawing/2010/main" val="0"/>
+              </a:ext>
+            </a:extLst>
+          </a:blip>
+          <a:stretch>
+            <a:fillRect/>
+          </a:stretch>
+        </p:blipFill>
+        <p:spPr>
+          <a:xfrm>
+            <a:off x="6195265" y="1259206"/>
+            <a:ext cx="5759817" cy="4319634"/>
+          </a:xfrm>
+          <a:prstGeom prst="rect">
+            <a:avLst/>
+          </a:prstGeom>
+        </p:spPr>
+      </p:pic>
+      <p:sp>
+        <p:nvSpPr>
+          <p:cNvPr id="8" name="TextBox 7">
+            <a:extLst>
+              <a:ext uri="{FF2B5EF4-FFF2-40B4-BE49-F238E27FC236}">
+                <a16:creationId xmlns:a16="http://schemas.microsoft.com/office/drawing/2014/main" id="{1A5C5CF1-B018-C81D-58A1-CD622C8609AA}"/>
+              </a:ext>
+            </a:extLst>
+          </p:cNvPr>
+          <p:cNvSpPr txBox="1"/>
+          <p:nvPr/>
+        </p:nvSpPr>
+        <p:spPr>
+          <a:xfrm>
+            <a:off x="6630748" y="5668880"/>
+            <a:ext cx="5742289" cy="646331"/>
+          </a:xfrm>
+          <a:prstGeom prst="rect">
+            <a:avLst/>
+          </a:prstGeom>
+          <a:noFill/>
+        </p:spPr>
+        <p:txBody>
+          <a:bodyPr wrap="square" rtlCol="0">
+            <a:spAutoFit/>
+          </a:bodyPr>
+          <a:lstStyle/>
+          <a:p>
+            <a:r>
+              <a:rPr lang="en-GB" i="1" dirty="0"/>
+              <a:t>Fig. X</a:t>
+            </a:r>
+            <a:r>
+              <a:rPr lang="en-GB" dirty="0"/>
+              <a:t>: UV output spectra for different GVD values of the input beam (Argon, 150mW, 0.4bar)</a:t>
+            </a:r>
+          </a:p>
+        </p:txBody>
+      </p:sp>
+    </p:spTree>
+    <p:extLst>
+      <p:ext uri="{BB962C8B-B14F-4D97-AF65-F5344CB8AC3E}">
+        <p14:creationId xmlns:p14="http://schemas.microsoft.com/office/powerpoint/2010/main" val="1568765709"/>
+      </p:ext>
+    </p:extLst>
+  </p:cSld>
+  <p:clrMapOvr>
+    <a:masterClrMapping/>
+  </p:clrMapOvr>
+</p:sld>
+</file>
+
+<file path=ppt/slides/slide11.xml><?xml version="1.0" encoding="utf-8"?>
+<p:sld xmlns:a="http://schemas.openxmlformats.org/drawingml/2006/main" xmlns:r="http://schemas.openxmlformats.org/officeDocument/2006/relationships" xmlns:p="http://schemas.openxmlformats.org/presentationml/2006/main">
+  <p:cSld>
+    <p:spTree>
+      <p:nvGrpSpPr>
+        <p:cNvPr id="1" name=""/>
+        <p:cNvGrpSpPr/>
+        <p:nvPr/>
+      </p:nvGrpSpPr>
+      <p:grpSpPr>
+        <a:xfrm>
+          <a:off x="0" y="0"/>
+          <a:ext cx="0" cy="0"/>
+          <a:chOff x="0" y="0"/>
+          <a:chExt cx="0" cy="0"/>
+        </a:xfrm>
+      </p:grpSpPr>
+      <p:pic>
+        <p:nvPicPr>
+          <p:cNvPr id="7" name="Content Placeholder 6" descr="A graph of a graph&#10;&#10;Description automatically generated">
+            <a:extLst>
+              <a:ext uri="{FF2B5EF4-FFF2-40B4-BE49-F238E27FC236}">
+                <a16:creationId xmlns:a16="http://schemas.microsoft.com/office/drawing/2014/main" id="{599F6B7C-915C-DB65-DE4B-D39116A63FF1}"/>
+              </a:ext>
+            </a:extLst>
+          </p:cNvPr>
+          <p:cNvPicPr>
+            <a:picLocks noGrp="1" noChangeAspect="1"/>
+          </p:cNvPicPr>
+          <p:nvPr>
+            <p:ph/>
+          </p:nvPr>
+        </p:nvPicPr>
+        <p:blipFill>
+          <a:blip r:embed="rId2" cstate="print">
+            <a:extLst>
+              <a:ext uri="{28A0092B-C50C-407E-A947-70E740481C1C}">
+                <a14:useLocalDpi xmlns:a14="http://schemas.microsoft.com/office/drawing/2010/main" val="0"/>
+              </a:ext>
+            </a:extLst>
+          </a:blip>
+          <a:stretch>
+            <a:fillRect/>
+          </a:stretch>
+        </p:blipFill>
+        <p:spPr>
+          <a:xfrm>
+            <a:off x="6096000" y="1269183"/>
+            <a:ext cx="5759817" cy="4319634"/>
+          </a:xfrm>
+        </p:spPr>
+      </p:pic>
+      <p:sp>
+        <p:nvSpPr>
+          <p:cNvPr id="4" name="Footer Placeholder 3">
+            <a:extLst>
+              <a:ext uri="{FF2B5EF4-FFF2-40B4-BE49-F238E27FC236}">
+                <a16:creationId xmlns:a16="http://schemas.microsoft.com/office/drawing/2014/main" id="{46C6C924-BB25-9422-0392-734B1CB4FF14}"/>
+              </a:ext>
+            </a:extLst>
+          </p:cNvPr>
+          <p:cNvSpPr>
+            <a:spLocks noGrp="1"/>
+          </p:cNvSpPr>
+          <p:nvPr>
+            <p:ph type="ftr" idx="1"/>
+          </p:nvPr>
+        </p:nvSpPr>
+        <p:spPr/>
+        <p:txBody>
+          <a:bodyPr/>
+          <a:lstStyle/>
+          <a:p>
+            <a:r>
+              <a:rPr lang="en-GB"/>
+              <a:t>| Project Presentation | David Amorim, 04.09.2023 </a:t>
+            </a:r>
+          </a:p>
+        </p:txBody>
+      </p:sp>
+      <p:sp>
+        <p:nvSpPr>
+          <p:cNvPr id="5" name="Title 4">
+            <a:extLst>
+              <a:ext uri="{FF2B5EF4-FFF2-40B4-BE49-F238E27FC236}">
+                <a16:creationId xmlns:a16="http://schemas.microsoft.com/office/drawing/2014/main" id="{3B425E9C-0288-AD91-7F55-4251C06D138C}"/>
+              </a:ext>
+            </a:extLst>
+          </p:cNvPr>
+          <p:cNvSpPr>
+            <a:spLocks noGrp="1"/>
+          </p:cNvSpPr>
+          <p:nvPr>
+            <p:ph type="title"/>
+          </p:nvPr>
+        </p:nvSpPr>
+        <p:spPr>
+          <a:xfrm>
+            <a:off x="407520" y="313920"/>
+            <a:ext cx="9968400" cy="450720"/>
+          </a:xfrm>
+        </p:spPr>
+        <p:txBody>
+          <a:bodyPr/>
+          <a:lstStyle/>
+          <a:p>
+            <a:r>
+              <a:rPr lang="en-US" b="1" spc="-1" dirty="0">
+                <a:solidFill>
+                  <a:srgbClr val="009FDF"/>
+                </a:solidFill>
+                <a:latin typeface="Arial"/>
+              </a:rPr>
+              <a:t>4.IV Effects of CEP</a:t>
+            </a:r>
+            <a:endParaRPr lang="en-GB" dirty="0"/>
+          </a:p>
+        </p:txBody>
+      </p:sp>
+      <p:sp>
+        <p:nvSpPr>
+          <p:cNvPr id="8" name="TextBox 7">
+            <a:extLst>
+              <a:ext uri="{FF2B5EF4-FFF2-40B4-BE49-F238E27FC236}">
+                <a16:creationId xmlns:a16="http://schemas.microsoft.com/office/drawing/2014/main" id="{E402C595-B1E6-A973-51B0-BCB449C914C5}"/>
+              </a:ext>
+            </a:extLst>
+          </p:cNvPr>
+          <p:cNvSpPr txBox="1"/>
+          <p:nvPr/>
+        </p:nvSpPr>
+        <p:spPr>
+          <a:xfrm>
+            <a:off x="6630748" y="5668880"/>
+            <a:ext cx="5742289" cy="646331"/>
+          </a:xfrm>
+          <a:prstGeom prst="rect">
+            <a:avLst/>
+          </a:prstGeom>
+          <a:noFill/>
+        </p:spPr>
+        <p:txBody>
+          <a:bodyPr wrap="square" rtlCol="0">
+            <a:spAutoFit/>
+          </a:bodyPr>
+          <a:lstStyle/>
+          <a:p>
+            <a:r>
+              <a:rPr lang="en-GB" i="1" dirty="0"/>
+              <a:t>Fig. X</a:t>
+            </a:r>
+            <a:r>
+              <a:rPr lang="en-GB" dirty="0"/>
+              <a:t>: UV output spectra for different CEP values of the input beam (Argon, 150mW, 0.4bar)</a:t>
+            </a:r>
+          </a:p>
+        </p:txBody>
+      </p:sp>
+      <p:sp>
+        <p:nvSpPr>
+          <p:cNvPr id="9" name="Content Placeholder 2">
+            <a:extLst>
+              <a:ext uri="{FF2B5EF4-FFF2-40B4-BE49-F238E27FC236}">
+                <a16:creationId xmlns:a16="http://schemas.microsoft.com/office/drawing/2014/main" id="{99128DF4-216D-92AC-1833-E8142F82867E}"/>
+              </a:ext>
+            </a:extLst>
+          </p:cNvPr>
+          <p:cNvSpPr txBox="1">
+            <a:spLocks/>
+          </p:cNvSpPr>
+          <p:nvPr/>
+        </p:nvSpPr>
+        <p:spPr>
+          <a:xfrm>
+            <a:off x="407881" y="1406520"/>
+            <a:ext cx="5688120" cy="5009760"/>
+          </a:xfrm>
+          <a:prstGeom prst="rect">
+            <a:avLst/>
+          </a:prstGeom>
+          <a:noFill/>
+          <a:ln w="0">
+            <a:noFill/>
+          </a:ln>
+        </p:spPr>
+        <p:txBody>
+          <a:bodyPr lIns="0" tIns="0" rIns="0" bIns="0" anchor="ctr">
+            <a:noAutofit/>
+          </a:bodyPr>
+          <a:lstStyle>
+            <a:lvl1pPr algn="l" defTabSz="914400" rtl="0" eaLnBrk="1" latinLnBrk="0" hangingPunct="1">
+              <a:lnSpc>
+                <a:spcPct val="90000"/>
+              </a:lnSpc>
+              <a:spcBef>
+                <a:spcPct val="0"/>
+              </a:spcBef>
+              <a:buNone/>
+              <a:defRPr sz="4400" kern="1200">
+                <a:solidFill>
+                  <a:schemeClr val="tx1"/>
+                </a:solidFill>
+                <a:latin typeface="+mj-lt"/>
+                <a:ea typeface="+mj-ea"/>
+                <a:cs typeface="+mj-cs"/>
+              </a:defRPr>
+            </a:lvl1pPr>
+          </a:lstStyle>
+          <a:p>
+            <a:pPr marL="457200" indent="-457200">
+              <a:buFont typeface="Arial" panose="020B0604020202020204" pitchFamily="34" charset="0"/>
+              <a:buChar char="•"/>
+            </a:pPr>
+            <a:r>
+              <a:rPr lang="en-GB" sz="2600" dirty="0"/>
+              <a:t>Barely any effect …. Don’t show??</a:t>
+            </a:r>
+          </a:p>
+        </p:txBody>
+      </p:sp>
+    </p:spTree>
+    <p:extLst>
+      <p:ext uri="{BB962C8B-B14F-4D97-AF65-F5344CB8AC3E}">
+        <p14:creationId xmlns:p14="http://schemas.microsoft.com/office/powerpoint/2010/main" val="2029954293"/>
+      </p:ext>
+    </p:extLst>
+  </p:cSld>
+  <p:clrMapOvr>
+    <a:masterClrMapping/>
+  </p:clrMapOvr>
+</p:sld>
+</file>
+
+<file path=ppt/slides/slide12.xml><?xml version="1.0" encoding="utf-8"?>
+<p:sld xmlns:a="http://schemas.openxmlformats.org/drawingml/2006/main" xmlns:r="http://schemas.openxmlformats.org/officeDocument/2006/relationships" xmlns:p="http://schemas.openxmlformats.org/presentationml/2006/main">
+  <p:cSld>
+    <p:spTree>
+      <p:nvGrpSpPr>
+        <p:cNvPr id="1" name=""/>
+        <p:cNvGrpSpPr/>
+        <p:nvPr/>
+      </p:nvGrpSpPr>
+      <p:grpSpPr>
+        <a:xfrm>
+          <a:off x="0" y="0"/>
+          <a:ext cx="0" cy="0"/>
+          <a:chOff x="0" y="0"/>
+          <a:chExt cx="0" cy="0"/>
+        </a:xfrm>
+      </p:grpSpPr>
+      <p:sp>
+        <p:nvSpPr>
+          <p:cNvPr id="4" name="Footer Placeholder 3">
+            <a:extLst>
+              <a:ext uri="{FF2B5EF4-FFF2-40B4-BE49-F238E27FC236}">
+                <a16:creationId xmlns:a16="http://schemas.microsoft.com/office/drawing/2014/main" id="{46C6C924-BB25-9422-0392-734B1CB4FF14}"/>
+              </a:ext>
+            </a:extLst>
+          </p:cNvPr>
+          <p:cNvSpPr>
+            <a:spLocks noGrp="1"/>
+          </p:cNvSpPr>
+          <p:nvPr>
+            <p:ph type="ftr" idx="1"/>
+          </p:nvPr>
+        </p:nvSpPr>
+        <p:spPr/>
+        <p:txBody>
+          <a:bodyPr/>
+          <a:lstStyle/>
+          <a:p>
+            <a:r>
+              <a:rPr lang="en-GB"/>
+              <a:t>| Project Presentation | David Amorim, 04.09.2023 </a:t>
+            </a:r>
+          </a:p>
+        </p:txBody>
+      </p:sp>
+      <p:sp>
+        <p:nvSpPr>
+          <p:cNvPr id="5" name="Title 4">
+            <a:extLst>
+              <a:ext uri="{FF2B5EF4-FFF2-40B4-BE49-F238E27FC236}">
+                <a16:creationId xmlns:a16="http://schemas.microsoft.com/office/drawing/2014/main" id="{3B425E9C-0288-AD91-7F55-4251C06D138C}"/>
+              </a:ext>
+            </a:extLst>
+          </p:cNvPr>
+          <p:cNvSpPr>
+            <a:spLocks noGrp="1"/>
+          </p:cNvSpPr>
+          <p:nvPr>
+            <p:ph type="title"/>
+          </p:nvPr>
+        </p:nvSpPr>
+        <p:spPr>
+          <a:xfrm>
+            <a:off x="279700" y="254928"/>
+            <a:ext cx="9968400" cy="450720"/>
+          </a:xfrm>
+        </p:spPr>
+        <p:txBody>
+          <a:bodyPr/>
+          <a:lstStyle/>
+          <a:p>
+            <a:r>
+              <a:rPr lang="en-US" b="1" spc="-1" dirty="0">
+                <a:solidFill>
+                  <a:srgbClr val="009FDF"/>
+                </a:solidFill>
+                <a:latin typeface="Arial"/>
+              </a:rPr>
+              <a:t>4.V Gas comparisons</a:t>
+            </a:r>
+            <a:endParaRPr lang="en-GB" dirty="0"/>
+          </a:p>
+        </p:txBody>
+      </p:sp>
+    </p:spTree>
+    <p:extLst>
+      <p:ext uri="{BB962C8B-B14F-4D97-AF65-F5344CB8AC3E}">
+        <p14:creationId xmlns:p14="http://schemas.microsoft.com/office/powerpoint/2010/main" val="2314419447"/>
+      </p:ext>
+    </p:extLst>
+  </p:cSld>
+  <p:clrMapOvr>
+    <a:masterClrMapping/>
+  </p:clrMapOvr>
+</p:sld>
+</file>
+
+<file path=ppt/slides/slide13.xml><?xml version="1.0" encoding="utf-8"?>
+<p:sld xmlns:a="http://schemas.openxmlformats.org/drawingml/2006/main" xmlns:r="http://schemas.openxmlformats.org/officeDocument/2006/relationships" xmlns:p="http://schemas.openxmlformats.org/presentationml/2006/main">
+  <p:cSld>
+    <p:spTree>
+      <p:nvGrpSpPr>
+        <p:cNvPr id="1" name=""/>
+        <p:cNvGrpSpPr/>
+        <p:nvPr/>
+      </p:nvGrpSpPr>
+      <p:grpSpPr>
+        <a:xfrm>
+          <a:off x="0" y="0"/>
+          <a:ext cx="0" cy="0"/>
+          <a:chOff x="0" y="0"/>
+          <a:chExt cx="0" cy="0"/>
+        </a:xfrm>
+      </p:grpSpPr>
+      <p:sp>
+        <p:nvSpPr>
+          <p:cNvPr id="3" name="Content Placeholder 2">
+            <a:extLst>
+              <a:ext uri="{FF2B5EF4-FFF2-40B4-BE49-F238E27FC236}">
+                <a16:creationId xmlns:a16="http://schemas.microsoft.com/office/drawing/2014/main" id="{91204B1A-F6F9-093B-E2B7-6FE91FBA9FCA}"/>
+              </a:ext>
+            </a:extLst>
+          </p:cNvPr>
+          <p:cNvSpPr>
+            <a:spLocks noGrp="1"/>
+          </p:cNvSpPr>
+          <p:nvPr>
+            <p:ph/>
+          </p:nvPr>
+        </p:nvSpPr>
+        <p:spPr>
+          <a:xfrm>
+            <a:off x="407880" y="1406520"/>
+            <a:ext cx="5150657" cy="5009760"/>
+          </a:xfrm>
+        </p:spPr>
+        <p:txBody>
+          <a:bodyPr/>
+          <a:lstStyle/>
+          <a:p>
+            <a:r>
+              <a:rPr lang="en-GB" dirty="0" err="1"/>
+              <a:t>defffef</a:t>
+            </a:r>
+            <a:endParaRPr lang="en-GB" dirty="0"/>
+          </a:p>
+        </p:txBody>
+      </p:sp>
+      <p:sp>
+        <p:nvSpPr>
+          <p:cNvPr id="4" name="Footer Placeholder 3">
+            <a:extLst>
+              <a:ext uri="{FF2B5EF4-FFF2-40B4-BE49-F238E27FC236}">
+                <a16:creationId xmlns:a16="http://schemas.microsoft.com/office/drawing/2014/main" id="{1218550F-47AC-3334-D475-23718EE2A07D}"/>
+              </a:ext>
+            </a:extLst>
+          </p:cNvPr>
+          <p:cNvSpPr>
+            <a:spLocks noGrp="1"/>
+          </p:cNvSpPr>
+          <p:nvPr>
+            <p:ph type="ftr" idx="1"/>
+          </p:nvPr>
+        </p:nvSpPr>
+        <p:spPr/>
+        <p:txBody>
+          <a:bodyPr/>
+          <a:lstStyle/>
+          <a:p>
+            <a:r>
+              <a:rPr lang="en-GB"/>
+              <a:t>| Project Presentation | David Amorim, 04.09.2023 </a:t>
+            </a:r>
+          </a:p>
+        </p:txBody>
+      </p:sp>
+      <p:sp>
+        <p:nvSpPr>
+          <p:cNvPr id="5" name="Title 4">
+            <a:extLst>
+              <a:ext uri="{FF2B5EF4-FFF2-40B4-BE49-F238E27FC236}">
+                <a16:creationId xmlns:a16="http://schemas.microsoft.com/office/drawing/2014/main" id="{A303F820-E439-9283-8B8F-4CEBF6FDDB42}"/>
+              </a:ext>
+            </a:extLst>
+          </p:cNvPr>
+          <p:cNvSpPr>
+            <a:spLocks noGrp="1"/>
+          </p:cNvSpPr>
+          <p:nvPr>
+            <p:ph type="title"/>
+          </p:nvPr>
+        </p:nvSpPr>
+        <p:spPr>
+          <a:xfrm>
+            <a:off x="407520" y="313920"/>
+            <a:ext cx="9968400" cy="450720"/>
+          </a:xfrm>
+        </p:spPr>
+        <p:txBody>
+          <a:bodyPr/>
+          <a:lstStyle/>
+          <a:p>
+            <a:r>
+              <a:rPr lang="en-US" b="1" spc="-1" dirty="0">
+                <a:solidFill>
+                  <a:srgbClr val="009FDF"/>
+                </a:solidFill>
+                <a:latin typeface="Arial"/>
+              </a:rPr>
+              <a:t>4.VI Comparing the gas cells</a:t>
+            </a:r>
+            <a:endParaRPr lang="en-GB" dirty="0"/>
+          </a:p>
+        </p:txBody>
+      </p:sp>
+      <p:sp>
+        <p:nvSpPr>
+          <p:cNvPr id="6" name="TextBox 5">
+            <a:extLst>
+              <a:ext uri="{FF2B5EF4-FFF2-40B4-BE49-F238E27FC236}">
+                <a16:creationId xmlns:a16="http://schemas.microsoft.com/office/drawing/2014/main" id="{9F9E40D0-3707-D0B1-8B5B-1AFB130DEE72}"/>
+              </a:ext>
+            </a:extLst>
+          </p:cNvPr>
+          <p:cNvSpPr txBox="1"/>
+          <p:nvPr/>
+        </p:nvSpPr>
+        <p:spPr>
+          <a:xfrm>
+            <a:off x="5558537" y="5769949"/>
+            <a:ext cx="6141850" cy="646331"/>
+          </a:xfrm>
+          <a:prstGeom prst="rect">
+            <a:avLst/>
+          </a:prstGeom>
+          <a:noFill/>
+        </p:spPr>
+        <p:txBody>
+          <a:bodyPr wrap="square" rtlCol="0">
+            <a:spAutoFit/>
+          </a:bodyPr>
+          <a:lstStyle/>
+          <a:p>
+            <a:r>
+              <a:rPr lang="en-GB" i="1" dirty="0"/>
+              <a:t>Fig. X: </a:t>
+            </a:r>
+            <a:r>
+              <a:rPr lang="en-GB" dirty="0"/>
+              <a:t>Simulated UV output produced with Argon at 150mW and 0.4bar comparing the new and old gas cells</a:t>
+            </a:r>
+          </a:p>
+        </p:txBody>
+      </p:sp>
+      <p:pic>
+        <p:nvPicPr>
+          <p:cNvPr id="7" name="Picture 6" descr="A graph of a graph&#10;&#10;Description automatically generated">
+            <a:extLst>
+              <a:ext uri="{FF2B5EF4-FFF2-40B4-BE49-F238E27FC236}">
+                <a16:creationId xmlns:a16="http://schemas.microsoft.com/office/drawing/2014/main" id="{48AD0DC9-1C89-EE82-9A94-15F0690F68F3}"/>
+              </a:ext>
+            </a:extLst>
+          </p:cNvPr>
+          <p:cNvPicPr>
+            <a:picLocks noChangeAspect="1"/>
+          </p:cNvPicPr>
+          <p:nvPr/>
+        </p:nvPicPr>
+        <p:blipFill>
+          <a:blip r:embed="rId2" cstate="print">
+            <a:extLst>
+              <a:ext uri="{28A0092B-C50C-407E-A947-70E740481C1C}">
+                <a14:useLocalDpi xmlns:a14="http://schemas.microsoft.com/office/drawing/2010/main" val="0"/>
+              </a:ext>
+            </a:extLst>
+          </a:blip>
+          <a:stretch>
+            <a:fillRect/>
+          </a:stretch>
+        </p:blipFill>
+        <p:spPr>
+          <a:xfrm>
+            <a:off x="5558537" y="1368055"/>
+            <a:ext cx="5759817" cy="4319634"/>
+          </a:xfrm>
+          <a:prstGeom prst="rect">
+            <a:avLst/>
+          </a:prstGeom>
+        </p:spPr>
+      </p:pic>
+    </p:spTree>
+    <p:extLst>
+      <p:ext uri="{BB962C8B-B14F-4D97-AF65-F5344CB8AC3E}">
+        <p14:creationId xmlns:p14="http://schemas.microsoft.com/office/powerpoint/2010/main" val="778572399"/>
+      </p:ext>
+    </p:extLst>
+  </p:cSld>
+  <p:clrMapOvr>
+    <a:masterClrMapping/>
+  </p:clrMapOvr>
+</p:sld>
+</file>
+
+<file path=ppt/slides/slide14.xml><?xml version="1.0" encoding="utf-8"?>
+<p:sld xmlns:a="http://schemas.openxmlformats.org/drawingml/2006/main" xmlns:r="http://schemas.openxmlformats.org/officeDocument/2006/relationships" xmlns:p="http://schemas.openxmlformats.org/presentationml/2006/main">
+  <p:cSld>
+    <p:spTree>
+      <p:nvGrpSpPr>
+        <p:cNvPr id="1" name=""/>
+        <p:cNvGrpSpPr/>
+        <p:nvPr/>
+      </p:nvGrpSpPr>
+      <p:grpSpPr>
+        <a:xfrm>
+          <a:off x="0" y="0"/>
+          <a:ext cx="0" cy="0"/>
+          <a:chOff x="0" y="0"/>
+          <a:chExt cx="0" cy="0"/>
+        </a:xfrm>
+      </p:grpSpPr>
+      <p:sp>
+        <p:nvSpPr>
+          <p:cNvPr id="3" name="Content Placeholder 2">
+            <a:extLst>
+              <a:ext uri="{FF2B5EF4-FFF2-40B4-BE49-F238E27FC236}">
+                <a16:creationId xmlns:a16="http://schemas.microsoft.com/office/drawing/2014/main" id="{2EFCD013-B2AB-55B3-F972-EE844736E6DB}"/>
+              </a:ext>
+            </a:extLst>
+          </p:cNvPr>
+          <p:cNvSpPr>
+            <a:spLocks noGrp="1"/>
+          </p:cNvSpPr>
+          <p:nvPr>
+            <p:ph/>
+          </p:nvPr>
+        </p:nvSpPr>
+        <p:spPr/>
+        <p:txBody>
+          <a:bodyPr/>
+          <a:lstStyle/>
+          <a:p>
+            <a:r>
+              <a:rPr lang="en-GB" dirty="0"/>
+              <a:t>The THG simulations resulted in some promising outputs</a:t>
+            </a:r>
+          </a:p>
+          <a:p>
+            <a:pPr lvl="1"/>
+            <a:r>
+              <a:rPr lang="en-GB" dirty="0"/>
+              <a:t>Agreement with experiment and literature </a:t>
+            </a:r>
+          </a:p>
+          <a:p>
+            <a:pPr lvl="1"/>
+            <a:r>
+              <a:rPr lang="en-GB" dirty="0"/>
+              <a:t>Some of the figures shown here will be used in the manuscript for </a:t>
+            </a:r>
+            <a:r>
+              <a:rPr lang="en-GB" dirty="0" err="1"/>
+              <a:t>JPhys</a:t>
+            </a:r>
+            <a:r>
+              <a:rPr lang="en-GB" dirty="0"/>
+              <a:t> Photonics being prepared </a:t>
+            </a:r>
+          </a:p>
+          <a:p>
+            <a:r>
+              <a:rPr lang="en-GB" dirty="0"/>
+              <a:t>There is significant room for further improvements</a:t>
+            </a:r>
+          </a:p>
+          <a:p>
+            <a:pPr lvl="1"/>
+            <a:r>
+              <a:rPr lang="en-GB" dirty="0"/>
+              <a:t>Base the spatial profile of the input beam on measured data (this requires dropping the assumption of radial symmetry)</a:t>
+            </a:r>
+          </a:p>
+          <a:p>
+            <a:pPr lvl="1"/>
+            <a:r>
+              <a:rPr lang="en-GB" dirty="0"/>
+              <a:t>Take into account that the beam channel radius changes throughout the chip </a:t>
+            </a:r>
+          </a:p>
+          <a:p>
+            <a:pPr lvl="1"/>
+            <a:r>
+              <a:rPr lang="en-GB" dirty="0"/>
+              <a:t>Further improve the COMSOL simulations </a:t>
+            </a:r>
+          </a:p>
+          <a:p>
+            <a:r>
+              <a:rPr lang="en-GB" dirty="0"/>
+              <a:t>With additional expansions, the simulation code could serve as a basis to back up future experiments with theory</a:t>
+            </a:r>
+          </a:p>
+        </p:txBody>
+      </p:sp>
+      <p:sp>
+        <p:nvSpPr>
+          <p:cNvPr id="4" name="Footer Placeholder 3">
+            <a:extLst>
+              <a:ext uri="{FF2B5EF4-FFF2-40B4-BE49-F238E27FC236}">
+                <a16:creationId xmlns:a16="http://schemas.microsoft.com/office/drawing/2014/main" id="{AB939DC5-2A2F-81B5-D32F-F0EDB7B26259}"/>
+              </a:ext>
+            </a:extLst>
+          </p:cNvPr>
+          <p:cNvSpPr>
+            <a:spLocks noGrp="1"/>
+          </p:cNvSpPr>
+          <p:nvPr>
+            <p:ph type="ftr" idx="1"/>
+          </p:nvPr>
+        </p:nvSpPr>
+        <p:spPr/>
+        <p:txBody>
+          <a:bodyPr/>
+          <a:lstStyle/>
+          <a:p>
+            <a:r>
+              <a:rPr lang="en-GB"/>
+              <a:t>| Project Presentation | David Amorim, 04.09.2023 </a:t>
+            </a:r>
+          </a:p>
+        </p:txBody>
+      </p:sp>
+      <p:sp>
+        <p:nvSpPr>
+          <p:cNvPr id="5" name="Title 4">
+            <a:extLst>
+              <a:ext uri="{FF2B5EF4-FFF2-40B4-BE49-F238E27FC236}">
+                <a16:creationId xmlns:a16="http://schemas.microsoft.com/office/drawing/2014/main" id="{F05ED68C-129F-B5D1-62BF-699364880A4A}"/>
+              </a:ext>
+            </a:extLst>
+          </p:cNvPr>
+          <p:cNvSpPr>
+            <a:spLocks noGrp="1"/>
+          </p:cNvSpPr>
+          <p:nvPr>
+            <p:ph type="title"/>
+          </p:nvPr>
+        </p:nvSpPr>
+        <p:spPr>
+          <a:xfrm>
+            <a:off x="407520" y="313920"/>
+            <a:ext cx="9968400" cy="450720"/>
+          </a:xfrm>
+        </p:spPr>
+        <p:txBody>
+          <a:bodyPr/>
+          <a:lstStyle/>
+          <a:p>
+            <a:r>
+              <a:rPr lang="en-US" b="1" spc="-1" dirty="0">
+                <a:solidFill>
+                  <a:srgbClr val="009FDF"/>
+                </a:solidFill>
+                <a:latin typeface="Arial"/>
+              </a:rPr>
+              <a:t>5. Discussion &amp; conclusion</a:t>
+            </a:r>
+            <a:endParaRPr lang="en-GB" dirty="0"/>
+          </a:p>
+        </p:txBody>
+      </p:sp>
+    </p:spTree>
+    <p:extLst>
+      <p:ext uri="{BB962C8B-B14F-4D97-AF65-F5344CB8AC3E}">
+        <p14:creationId xmlns:p14="http://schemas.microsoft.com/office/powerpoint/2010/main" val="2038300810"/>
+      </p:ext>
+    </p:extLst>
+  </p:cSld>
+  <p:clrMapOvr>
+    <a:masterClrMapping/>
+  </p:clrMapOvr>
+</p:sld>
+</file>
+
+<file path=ppt/slides/slide15.xml><?xml version="1.0" encoding="utf-8"?>
+<p:sld xmlns:a="http://schemas.openxmlformats.org/drawingml/2006/main" xmlns:r="http://schemas.openxmlformats.org/officeDocument/2006/relationships" xmlns:p="http://schemas.openxmlformats.org/presentationml/2006/main">
+  <p:cSld>
+    <p:spTree>
+      <p:nvGrpSpPr>
+        <p:cNvPr id="1" name=""/>
+        <p:cNvGrpSpPr/>
+        <p:nvPr/>
+      </p:nvGrpSpPr>
+      <p:grpSpPr>
+        <a:xfrm>
+          <a:off x="0" y="0"/>
+          <a:ext cx="0" cy="0"/>
+          <a:chOff x="0" y="0"/>
+          <a:chExt cx="0" cy="0"/>
+        </a:xfrm>
+      </p:grpSpPr>
+      <p:sp>
+        <p:nvSpPr>
+          <p:cNvPr id="2" name="Title 1">
+            <a:extLst>
+              <a:ext uri="{FF2B5EF4-FFF2-40B4-BE49-F238E27FC236}">
+                <a16:creationId xmlns:a16="http://schemas.microsoft.com/office/drawing/2014/main" id="{B5DA8603-104C-93BF-B64B-70EBE5785F36}"/>
+              </a:ext>
+            </a:extLst>
+          </p:cNvPr>
+          <p:cNvSpPr>
+            <a:spLocks noGrp="1"/>
+          </p:cNvSpPr>
+          <p:nvPr>
+            <p:ph type="title"/>
+          </p:nvPr>
+        </p:nvSpPr>
+        <p:spPr/>
+        <p:txBody>
+          <a:bodyPr/>
+          <a:lstStyle/>
+          <a:p>
+            <a:r>
+              <a:rPr lang="en-US" sz="4400" b="1" strike="noStrike" spc="-1" dirty="0">
+                <a:solidFill>
+                  <a:srgbClr val="009FDF"/>
+                </a:solidFill>
+                <a:latin typeface="Arial"/>
+              </a:rPr>
+              <a:t>6. Acknowledgments &amp; References</a:t>
+            </a:r>
+            <a:endParaRPr lang="en-GB" dirty="0"/>
+          </a:p>
+        </p:txBody>
+      </p:sp>
+      <p:sp>
+        <p:nvSpPr>
+          <p:cNvPr id="4" name="Footer Placeholder 3">
+            <a:extLst>
+              <a:ext uri="{FF2B5EF4-FFF2-40B4-BE49-F238E27FC236}">
+                <a16:creationId xmlns:a16="http://schemas.microsoft.com/office/drawing/2014/main" id="{A6B15F38-5E1E-8FDC-71E3-7E43E9128217}"/>
+              </a:ext>
+            </a:extLst>
+          </p:cNvPr>
+          <p:cNvSpPr>
+            <a:spLocks noGrp="1"/>
+          </p:cNvSpPr>
+          <p:nvPr>
+            <p:ph type="ftr" idx="1"/>
+          </p:nvPr>
+        </p:nvSpPr>
+        <p:spPr/>
+        <p:txBody>
+          <a:bodyPr/>
+          <a:lstStyle/>
+          <a:p>
+            <a:r>
+              <a:rPr lang="en-GB"/>
+              <a:t>| Project Presentation | David Amorim, 04.09.2023 </a:t>
+            </a:r>
+          </a:p>
+        </p:txBody>
+      </p:sp>
+      <p:sp>
+        <p:nvSpPr>
+          <p:cNvPr id="3" name="Content Placeholder 2">
+            <a:extLst>
+              <a:ext uri="{FF2B5EF4-FFF2-40B4-BE49-F238E27FC236}">
+                <a16:creationId xmlns:a16="http://schemas.microsoft.com/office/drawing/2014/main" id="{0CF2CD06-D9EC-AA51-309B-9F7B11A3AE9B}"/>
+              </a:ext>
+            </a:extLst>
+          </p:cNvPr>
+          <p:cNvSpPr>
+            <a:spLocks noGrp="1"/>
+          </p:cNvSpPr>
+          <p:nvPr>
+            <p:ph/>
+          </p:nvPr>
+        </p:nvSpPr>
+        <p:spPr/>
+        <p:txBody>
+          <a:bodyPr>
+            <a:normAutofit fontScale="92500"/>
+          </a:bodyPr>
+          <a:lstStyle/>
+          <a:p>
+            <a:pPr marL="0" indent="0">
+              <a:buNone/>
+            </a:pPr>
+            <a:r>
+              <a:rPr lang="en-GB" b="1" dirty="0"/>
+              <a:t>Acknowledgments</a:t>
+            </a:r>
+          </a:p>
+          <a:p>
+            <a:pPr marL="0" indent="0">
+              <a:buNone/>
+            </a:pPr>
+            <a:r>
+              <a:rPr lang="en-GB" dirty="0"/>
+              <a:t>Thank you to </a:t>
+            </a:r>
+            <a:r>
+              <a:rPr lang="en-GB" dirty="0" err="1"/>
+              <a:t>Josina</a:t>
+            </a:r>
+            <a:r>
+              <a:rPr lang="en-GB" dirty="0"/>
+              <a:t> Hahne, Vincent </a:t>
+            </a:r>
+            <a:r>
+              <a:rPr lang="en-GB" dirty="0" err="1"/>
+              <a:t>Wanie</a:t>
+            </a:r>
+            <a:r>
+              <a:rPr lang="en-GB" dirty="0"/>
+              <a:t>, and Agata </a:t>
+            </a:r>
+            <a:r>
+              <a:rPr lang="en-GB" dirty="0" err="1"/>
+              <a:t>Azzolin</a:t>
+            </a:r>
+            <a:r>
+              <a:rPr lang="en-GB" dirty="0"/>
+              <a:t> for their help with the project as well as to the rest of the CFEL-ATTO team for being so welcoming.</a:t>
+            </a:r>
+          </a:p>
+          <a:p>
+            <a:pPr marL="0" indent="0">
+              <a:buNone/>
+            </a:pPr>
+            <a:endParaRPr lang="en-GB" dirty="0"/>
+          </a:p>
+          <a:p>
+            <a:pPr marL="0" indent="0">
+              <a:buNone/>
+            </a:pPr>
+            <a:r>
+              <a:rPr lang="en-GB" b="1" dirty="0"/>
+              <a:t>References</a:t>
+            </a:r>
+          </a:p>
+          <a:p>
+            <a:pPr marL="0" indent="0" algn="l">
+              <a:buNone/>
+            </a:pPr>
+            <a:r>
+              <a:rPr lang="en-GB" sz="2600" dirty="0"/>
+              <a:t>[1] C. Brahms and J. C. Travers, “</a:t>
+            </a:r>
+            <a:r>
+              <a:rPr lang="en-GB" sz="2600" i="1" dirty="0" err="1"/>
+              <a:t>Luna.jl</a:t>
+            </a:r>
+            <a:r>
+              <a:rPr lang="en-GB" sz="2600" dirty="0"/>
+              <a:t>,” (2023); https://doi.org/10.5281/zenodo.8242646</a:t>
+            </a:r>
+          </a:p>
+          <a:p>
+            <a:pPr marL="0" indent="0" algn="l">
+              <a:buNone/>
+            </a:pPr>
+            <a:r>
+              <a:rPr lang="en-GB" sz="2600" dirty="0"/>
+              <a:t>[2] M. </a:t>
+            </a:r>
+            <a:r>
+              <a:rPr lang="en-GB" sz="2600" dirty="0" err="1"/>
+              <a:t>Kolesik</a:t>
+            </a:r>
+            <a:r>
+              <a:rPr lang="en-GB" sz="2600" dirty="0"/>
+              <a:t> and J. V. Moloney, “</a:t>
+            </a:r>
+            <a:r>
+              <a:rPr lang="en-GB" sz="2600" i="1" dirty="0"/>
+              <a:t>Nonlinear optical pulse propagation simulation: From Maxwell’s to unidirectional equations</a:t>
+            </a:r>
+            <a:r>
+              <a:rPr lang="en-GB" sz="2600" dirty="0"/>
+              <a:t>,” Phys. Rev. E </a:t>
+            </a:r>
+            <a:r>
+              <a:rPr lang="en-GB" sz="2600" b="1" dirty="0"/>
+              <a:t>70</a:t>
+            </a:r>
+            <a:r>
+              <a:rPr lang="en-GB" sz="2600" dirty="0"/>
+              <a:t>, 036 604 (2004) </a:t>
+            </a:r>
+          </a:p>
+          <a:p>
+            <a:pPr marL="0" indent="0" algn="l">
+              <a:buNone/>
+            </a:pPr>
+            <a:r>
+              <a:rPr lang="en-GB" sz="2600" dirty="0"/>
+              <a:t>[3] </a:t>
+            </a:r>
+            <a:r>
+              <a:rPr lang="de-DE" sz="2600" dirty="0"/>
+              <a:t>F. Reiter, U. Graf, </a:t>
+            </a:r>
+            <a:r>
+              <a:rPr lang="en-GB" sz="2600" dirty="0"/>
+              <a:t>et al. “</a:t>
+            </a:r>
+            <a:r>
+              <a:rPr lang="en-GB" sz="2600" i="1" dirty="0"/>
+              <a:t>Route to Attosecond Nonlinear Spectroscopy</a:t>
+            </a:r>
+            <a:r>
+              <a:rPr lang="en-GB" sz="2600" dirty="0"/>
+              <a:t>,” Phys. Rev. Lett. </a:t>
+            </a:r>
+            <a:r>
+              <a:rPr lang="en-GB" sz="2600" b="1" dirty="0"/>
+              <a:t>105</a:t>
+            </a:r>
+            <a:r>
+              <a:rPr lang="en-GB" sz="2600" dirty="0"/>
+              <a:t>, 243 902 (2010)</a:t>
+            </a:r>
+          </a:p>
+        </p:txBody>
+      </p:sp>
+    </p:spTree>
+    <p:extLst>
+      <p:ext uri="{BB962C8B-B14F-4D97-AF65-F5344CB8AC3E}">
+        <p14:creationId xmlns:p14="http://schemas.microsoft.com/office/powerpoint/2010/main" val="4106140771"/>
+      </p:ext>
+    </p:extLst>
+  </p:cSld>
+  <p:clrMapOvr>
+    <a:masterClrMapping/>
+  </p:clrMapOvr>
+</p:sld>
+</file>
+
 <file path=ppt/slides/slide2.xml><?xml version="1.0" encoding="utf-8"?>
 <p:sld xmlns:a="http://schemas.openxmlformats.org/drawingml/2006/main" xmlns:r="http://schemas.openxmlformats.org/officeDocument/2006/relationships" xmlns:p="http://schemas.openxmlformats.org/presentationml/2006/main">
   <p:cSld>
@@ -6824,10 +8089,10 @@
       </p:sp>
       <p:sp>
         <p:nvSpPr>
-          <p:cNvPr id="2" name="Content Placeholder 1">
+          <p:cNvPr id="4" name="Content Placeholder 3">
             <a:extLst>
               <a:ext uri="{FF2B5EF4-FFF2-40B4-BE49-F238E27FC236}">
-                <a16:creationId xmlns:a16="http://schemas.microsoft.com/office/drawing/2014/main" id="{AEC292FC-B68B-6BD0-9FD1-195C942B2E43}"/>
+                <a16:creationId xmlns:a16="http://schemas.microsoft.com/office/drawing/2014/main" id="{3AACE186-D916-39A5-9ECE-AC773E76E542}"/>
               </a:ext>
             </a:extLst>
           </p:cNvPr>
@@ -6840,8 +8105,130 @@
         </p:nvSpPr>
         <p:spPr/>
         <p:txBody>
-          <a:bodyPr/>
-          <a:lstStyle/>
+          <a:bodyPr>
+            <a:normAutofit lnSpcReduction="10000"/>
+          </a:bodyPr>
+          <a:lstStyle/>
+          <a:p>
+            <a:pPr marL="514350" indent="-514350">
+              <a:buFont typeface="+mj-lt"/>
+              <a:buAutoNum type="arabicPeriod"/>
+            </a:pPr>
+            <a:r>
+              <a:rPr lang="en-GB" dirty="0"/>
+              <a:t>Motivation</a:t>
+            </a:r>
+          </a:p>
+          <a:p>
+            <a:pPr marL="514350" indent="-514350">
+              <a:buFont typeface="+mj-lt"/>
+              <a:buAutoNum type="arabicPeriod"/>
+            </a:pPr>
+            <a:r>
+              <a:rPr lang="en-GB" dirty="0"/>
+              <a:t>Background</a:t>
+            </a:r>
+          </a:p>
+          <a:p>
+            <a:pPr marL="514350" indent="-514350">
+              <a:buFont typeface="+mj-lt"/>
+              <a:buAutoNum type="arabicPeriod"/>
+            </a:pPr>
+            <a:r>
+              <a:rPr lang="en-GB" dirty="0"/>
+              <a:t>Simulation inputs</a:t>
+            </a:r>
+          </a:p>
+          <a:p>
+            <a:pPr marL="514350" indent="-514350">
+              <a:buFont typeface="+mj-lt"/>
+              <a:buAutoNum type="arabicPeriod"/>
+            </a:pPr>
+            <a:r>
+              <a:rPr lang="en-GB" dirty="0"/>
+              <a:t>Simulation output</a:t>
+            </a:r>
+          </a:p>
+          <a:p>
+            <a:pPr marL="971550" lvl="1" indent="-514350">
+              <a:buFont typeface="+mj-lt"/>
+              <a:buAutoNum type="romanUcPeriod"/>
+            </a:pPr>
+            <a:r>
+              <a:rPr lang="en-GB" dirty="0"/>
+              <a:t>Comparison with experiment</a:t>
+            </a:r>
+          </a:p>
+          <a:p>
+            <a:pPr marL="971550" lvl="1" indent="-514350">
+              <a:buFont typeface="+mj-lt"/>
+              <a:buAutoNum type="romanUcPeriod"/>
+            </a:pPr>
+            <a:r>
+              <a:rPr lang="en-GB" dirty="0"/>
+              <a:t>Self-steepening</a:t>
+            </a:r>
+          </a:p>
+          <a:p>
+            <a:pPr marL="971550" lvl="1" indent="-514350">
+              <a:buFont typeface="+mj-lt"/>
+              <a:buAutoNum type="romanUcPeriod"/>
+            </a:pPr>
+            <a:r>
+              <a:rPr lang="en-GB" dirty="0"/>
+              <a:t>Effects of chirp </a:t>
+            </a:r>
+          </a:p>
+          <a:p>
+            <a:pPr marL="971550" lvl="1" indent="-514350">
+              <a:buFont typeface="+mj-lt"/>
+              <a:buAutoNum type="romanUcPeriod"/>
+            </a:pPr>
+            <a:r>
+              <a:rPr lang="en-GB" dirty="0"/>
+              <a:t>Effects of CEP</a:t>
+            </a:r>
+          </a:p>
+          <a:p>
+            <a:pPr marL="971550" lvl="1" indent="-514350">
+              <a:buFont typeface="+mj-lt"/>
+              <a:buAutoNum type="romanUcPeriod"/>
+            </a:pPr>
+            <a:r>
+              <a:rPr lang="en-GB" dirty="0"/>
+              <a:t>Gas comparisons</a:t>
+            </a:r>
+          </a:p>
+          <a:p>
+            <a:pPr marL="971550" lvl="1" indent="-514350">
+              <a:buFont typeface="+mj-lt"/>
+              <a:buAutoNum type="romanUcPeriod"/>
+            </a:pPr>
+            <a:r>
+              <a:rPr lang="en-GB" dirty="0"/>
+              <a:t>Gas cell comparisons</a:t>
+            </a:r>
+          </a:p>
+          <a:p>
+            <a:pPr marL="514350" indent="-514350">
+              <a:buFont typeface="+mj-lt"/>
+              <a:buAutoNum type="arabicPeriod"/>
+            </a:pPr>
+            <a:r>
+              <a:rPr lang="en-GB" dirty="0"/>
+              <a:t>Discussion &amp; conclusion</a:t>
+            </a:r>
+          </a:p>
+          <a:p>
+            <a:pPr marL="514350" indent="-514350">
+              <a:buFont typeface="+mj-lt"/>
+              <a:buAutoNum type="arabicPeriod"/>
+            </a:pPr>
+            <a:r>
+              <a:rPr lang="en-GB" dirty="0"/>
+              <a:t>Acknowledgments &amp; references</a:t>
+            </a:r>
+          </a:p>
           <a:p>
             <a:endParaRPr lang="en-GB" dirty="0"/>
           </a:p>
@@ -6910,7 +8297,7 @@
                 </a:solidFill>
                 <a:latin typeface="Arial"/>
               </a:rPr>
-              <a:t>Motivation</a:t>
+              <a:t>1. Motivation</a:t>
             </a:r>
             <a:endParaRPr lang="en-US" sz="2200" b="0" strike="noStrike" spc="-1" dirty="0">
               <a:solidFill>
@@ -7019,10 +8406,10 @@
       </p:sp>
       <p:sp>
         <p:nvSpPr>
-          <p:cNvPr id="2" name="Content Placeholder 1">
+          <p:cNvPr id="4" name="Content Placeholder 3">
             <a:extLst>
               <a:ext uri="{FF2B5EF4-FFF2-40B4-BE49-F238E27FC236}">
-                <a16:creationId xmlns:a16="http://schemas.microsoft.com/office/drawing/2014/main" id="{9CD771E6-F97B-67BB-488D-FF5B12FE305D}"/>
+                <a16:creationId xmlns:a16="http://schemas.microsoft.com/office/drawing/2014/main" id="{FABF4ECD-C9C3-8B02-7216-51901ACD7D3C}"/>
               </a:ext>
             </a:extLst>
           </p:cNvPr>
@@ -7033,12 +8420,159 @@
             <p:ph/>
           </p:nvPr>
         </p:nvSpPr>
-        <p:spPr/>
-        <p:txBody>
-          <a:bodyPr/>
-          <a:lstStyle/>
-          <a:p>
-            <a:endParaRPr lang="en-GB" dirty="0"/>
+        <p:spPr>
+          <a:xfrm>
+            <a:off x="407880" y="1406520"/>
+            <a:ext cx="5796275" cy="5009760"/>
+          </a:xfrm>
+        </p:spPr>
+        <p:txBody>
+          <a:bodyPr>
+            <a:normAutofit fontScale="92500" lnSpcReduction="20000"/>
+          </a:bodyPr>
+          <a:lstStyle/>
+          <a:p>
+            <a:r>
+              <a:rPr lang="en-GB" dirty="0"/>
+              <a:t>The CFEL-ATTO group uses THG of few-femtosecond IR laser pulses in a gas cell to produce ultrashort UV pulses </a:t>
+            </a:r>
+          </a:p>
+          <a:p>
+            <a:r>
+              <a:rPr lang="en-GB" dirty="0"/>
+              <a:t>This process is sensitive to a variety of experimental parameters</a:t>
+            </a:r>
+          </a:p>
+          <a:p>
+            <a:r>
+              <a:rPr lang="en-GB" dirty="0"/>
+              <a:t>The aim of this project was to produce simulations of the THG process in order to </a:t>
+            </a:r>
+          </a:p>
+          <a:p>
+            <a:pPr marL="914400" lvl="1" indent="-457200">
+              <a:buFont typeface="+mj-lt"/>
+              <a:buAutoNum type="alphaLcPeriod"/>
+            </a:pPr>
+            <a:r>
+              <a:rPr lang="en-GB" dirty="0"/>
+              <a:t>Reproduce the experimental conditions in the gas </a:t>
+            </a:r>
+          </a:p>
+          <a:p>
+            <a:pPr marL="914400" lvl="1" indent="-457200">
+              <a:buFont typeface="+mj-lt"/>
+              <a:buAutoNum type="alphaLcPeriod"/>
+            </a:pPr>
+            <a:r>
+              <a:rPr lang="en-GB" dirty="0"/>
+              <a:t>Study the effects dominating the THG process </a:t>
+            </a:r>
+          </a:p>
+          <a:p>
+            <a:pPr marL="914400" lvl="1" indent="-457200">
+              <a:buFont typeface="+mj-lt"/>
+              <a:buAutoNum type="alphaLcPeriod"/>
+            </a:pPr>
+            <a:r>
+              <a:rPr lang="en-GB" dirty="0"/>
+              <a:t>Investigate how changes to different input parameters affect the UV pulses</a:t>
+            </a:r>
+          </a:p>
+          <a:p>
+            <a:pPr marL="914400" lvl="1" indent="-457200">
+              <a:buFont typeface="+mj-lt"/>
+              <a:buAutoNum type="alphaLcPeriod"/>
+            </a:pPr>
+            <a:r>
+              <a:rPr lang="en-GB" dirty="0"/>
+              <a:t>Compare the new gas chip to the old (2019) cell </a:t>
+            </a:r>
+          </a:p>
+        </p:txBody>
+      </p:sp>
+      <p:sp>
+        <p:nvSpPr>
+          <p:cNvPr id="5" name="Rectangle 4">
+            <a:extLst>
+              <a:ext uri="{FF2B5EF4-FFF2-40B4-BE49-F238E27FC236}">
+                <a16:creationId xmlns:a16="http://schemas.microsoft.com/office/drawing/2014/main" id="{BF720975-BFBC-C39D-00F4-D6EDEE704E09}"/>
+              </a:ext>
+            </a:extLst>
+          </p:cNvPr>
+          <p:cNvSpPr/>
+          <p:nvPr/>
+        </p:nvSpPr>
+        <p:spPr>
+          <a:xfrm>
+            <a:off x="6234339" y="1199535"/>
+            <a:ext cx="5760000" cy="4320000"/>
+          </a:xfrm>
+          <a:prstGeom prst="rect">
+            <a:avLst/>
+          </a:prstGeom>
+        </p:spPr>
+        <p:style>
+          <a:lnRef idx="2">
+            <a:schemeClr val="accent1">
+              <a:shade val="15000"/>
+            </a:schemeClr>
+          </a:lnRef>
+          <a:fillRef idx="1">
+            <a:schemeClr val="accent1"/>
+          </a:fillRef>
+          <a:effectRef idx="0">
+            <a:schemeClr val="accent1"/>
+          </a:effectRef>
+          <a:fontRef idx="minor">
+            <a:schemeClr val="lt1"/>
+          </a:fontRef>
+        </p:style>
+        <p:txBody>
+          <a:bodyPr rtlCol="0" anchor="ctr"/>
+          <a:lstStyle/>
+          <a:p>
+            <a:pPr algn="ctr"/>
+            <a:endParaRPr lang="en-GB"/>
+          </a:p>
+        </p:txBody>
+      </p:sp>
+      <p:sp>
+        <p:nvSpPr>
+          <p:cNvPr id="6" name="TextBox 5">
+            <a:extLst>
+              <a:ext uri="{FF2B5EF4-FFF2-40B4-BE49-F238E27FC236}">
+                <a16:creationId xmlns:a16="http://schemas.microsoft.com/office/drawing/2014/main" id="{89D2AFD6-414F-5556-E08D-7A61A36D5604}"/>
+              </a:ext>
+            </a:extLst>
+          </p:cNvPr>
+          <p:cNvSpPr txBox="1"/>
+          <p:nvPr/>
+        </p:nvSpPr>
+        <p:spPr>
+          <a:xfrm>
+            <a:off x="8032955" y="5751871"/>
+            <a:ext cx="3390672" cy="369332"/>
+          </a:xfrm>
+          <a:prstGeom prst="rect">
+            <a:avLst/>
+          </a:prstGeom>
+          <a:noFill/>
+        </p:spPr>
+        <p:txBody>
+          <a:bodyPr wrap="none" rtlCol="0">
+            <a:spAutoFit/>
+          </a:bodyPr>
+          <a:lstStyle/>
+          <a:p>
+            <a:r>
+              <a:rPr lang="en-GB" i="1" dirty="0"/>
+              <a:t>Fig. X</a:t>
+            </a:r>
+            <a:r>
+              <a:rPr lang="en-GB" dirty="0"/>
+              <a:t>: the old and new gas cell</a:t>
+            </a:r>
           </a:p>
         </p:txBody>
       </p:sp>
@@ -7110,7 +8644,7 @@
                 </a:solidFill>
                 <a:latin typeface="Arial"/>
               </a:rPr>
-              <a:t>Background</a:t>
+              <a:t>2. Background</a:t>
             </a:r>
             <a:endParaRPr lang="en-US" sz="2200" b="0" strike="noStrike" spc="-1" dirty="0">
               <a:solidFill>
@@ -7235,68 +8769,91 @@
                 <p:ph/>
               </p:nvPr>
             </p:nvSpPr>
-            <p:spPr/>
+            <p:spPr>
+              <a:xfrm>
+                <a:off x="410092" y="1337187"/>
+                <a:ext cx="11375640" cy="5083278"/>
+              </a:xfrm>
+            </p:spPr>
             <p:txBody>
               <a:bodyPr>
-                <a:normAutofit fontScale="92500"/>
+                <a:noAutofit/>
               </a:bodyPr>
               <a:lstStyle/>
               <a:p>
                 <a:r>
-                  <a:rPr lang="en-GB" dirty="0"/>
+                  <a:rPr lang="en-GB" sz="2600" dirty="0">
+                    <a:latin typeface="+mn-lt"/>
+                  </a:rPr>
                   <a:t>The simulations were produced using the </a:t>
                 </a:r>
                 <a:r>
-                  <a:rPr lang="en-GB" i="1" dirty="0" err="1"/>
+                  <a:rPr lang="en-GB" sz="2600" i="1" dirty="0" err="1">
+                    <a:latin typeface="+mn-lt"/>
+                  </a:rPr>
                   <a:t>Luna.jl</a:t>
                 </a:r>
                 <a:r>
-                  <a:rPr lang="en-GB" i="1" dirty="0"/>
+                  <a:rPr lang="en-GB" sz="2600" i="1" dirty="0">
+                    <a:latin typeface="+mn-lt"/>
+                  </a:rPr>
                   <a:t> </a:t>
                 </a:r>
                 <a:r>
-                  <a:rPr lang="en-GB" dirty="0"/>
+                  <a:rPr lang="en-GB" sz="2600" dirty="0">
+                    <a:latin typeface="+mn-lt"/>
+                  </a:rPr>
                   <a:t>package [1]</a:t>
                 </a:r>
               </a:p>
               <a:p>
                 <a:r>
-                  <a:rPr lang="en-GB" dirty="0"/>
+                  <a:rPr lang="en-GB" sz="2600" dirty="0">
+                    <a:latin typeface="+mn-lt"/>
+                  </a:rPr>
                   <a:t>Luna numerically solves the unidirectional pulse propagation equation (UPPE) for a pulse travelling in the </a:t>
                 </a:r>
                 <a:r>
-                  <a:rPr lang="en-GB" i="1" dirty="0"/>
+                  <a:rPr lang="en-GB" sz="2600" i="1" dirty="0">
+                    <a:latin typeface="+mn-lt"/>
+                  </a:rPr>
                   <a:t>z</a:t>
                 </a:r>
                 <a:r>
-                  <a:rPr lang="en-GB" dirty="0"/>
+                  <a:rPr lang="en-GB" sz="2600" dirty="0">
+                    <a:latin typeface="+mn-lt"/>
+                  </a:rPr>
                   <a:t>-direction:</a:t>
                 </a:r>
               </a:p>
               <a:p>
-                <a:endParaRPr lang="en-GB" dirty="0"/>
+                <a:endParaRPr lang="en-GB" dirty="0">
+                  <a:latin typeface="+mn-lt"/>
+                </a:endParaRPr>
               </a:p>
               <a:p>
                 <a:pPr marL="0" indent="0">
                   <a:buNone/>
                 </a:pPr>
-                <a:endParaRPr lang="en-GB" dirty="0"/>
+                <a:endParaRPr lang="en-GB" dirty="0">
+                  <a:latin typeface="+mn-lt"/>
+                </a:endParaRPr>
               </a:p>
               <a:p>
                 <a:pPr lvl="2"/>
                 <a14:m>
                   <m:oMath xmlns:m="http://schemas.openxmlformats.org/officeDocument/2006/math">
                     <m:r>
-                      <a:rPr lang="en-GB" b="1" i="1" smtClean="0">
-                        <a:latin typeface="Cambria Math" panose="02040503050406030204" pitchFamily="18" charset="0"/>
+                      <a:rPr lang="en-GB" sz="1800" b="1" i="1" smtClean="0">
+                        <a:latin typeface="+mn-lt"/>
                       </a:rPr>
                       <m:t>𝑬</m:t>
                     </m:r>
                     <m:d>
                       <m:dPr>
                         <m:ctrlPr>
-                          <a:rPr lang="en-GB" b="0" i="1" smtClean="0">
-                            <a:latin typeface="Cambria Math" panose="02040503050406030204" pitchFamily="18" charset="0"/>
+                          <a:rPr lang="en-GB" sz="1800" b="0" i="1" smtClean="0">
+                            <a:latin typeface="+mn-lt"/>
                           </a:rPr>
                         </m:ctrlPr>
                       </m:dPr>
@@ -7305,51 +8862,51 @@
                           <m:rPr>
                             <m:sty m:val="p"/>
                           </m:rPr>
-                          <a:rPr lang="en-GB" b="0" i="1" smtClean="0">
-                            <a:latin typeface="Cambria Math" panose="02040503050406030204" pitchFamily="18" charset="0"/>
+                          <a:rPr lang="en-GB" sz="1800" b="0" i="1" smtClean="0">
+                            <a:latin typeface="+mn-lt"/>
                           </a:rPr>
                           <m:t>ω</m:t>
                         </m:r>
                         <m:r>
-                          <a:rPr lang="en-GB" b="0" i="1" smtClean="0">
-                            <a:latin typeface="Cambria Math" panose="02040503050406030204" pitchFamily="18" charset="0"/>
+                          <a:rPr lang="en-GB" sz="1800" b="0" i="1" smtClean="0">
+                            <a:latin typeface="+mn-lt"/>
                           </a:rPr>
                           <m:t>, </m:t>
                         </m:r>
                         <m:sSub>
                           <m:sSubPr>
                             <m:ctrlPr>
-                              <a:rPr lang="en-GB" b="1" i="1" smtClean="0">
-                                <a:latin typeface="Cambria Math" panose="02040503050406030204" pitchFamily="18" charset="0"/>
+                              <a:rPr lang="en-GB" sz="1800" b="1" i="1" smtClean="0">
+                                <a:latin typeface="+mn-lt"/>
                               </a:rPr>
                             </m:ctrlPr>
                           </m:sSubPr>
                           <m:e>
                             <m:r>
-                              <a:rPr lang="en-GB" b="1" i="1" smtClean="0">
-                                <a:latin typeface="Cambria Math" panose="02040503050406030204" pitchFamily="18" charset="0"/>
+                              <a:rPr lang="en-GB" sz="1800" b="1" i="1" smtClean="0">
+                                <a:latin typeface="+mn-lt"/>
                               </a:rPr>
                               <m:t>𝒌</m:t>
                             </m:r>
                           </m:e>
                           <m:sub>
                             <m:r>
-                              <a:rPr lang="en-GB" b="1" i="1" smtClean="0">
-                                <a:latin typeface="Cambria Math" panose="02040503050406030204" pitchFamily="18" charset="0"/>
+                              <a:rPr lang="en-GB" sz="1800" b="1" i="1" smtClean="0">
+                                <a:latin typeface="+mn-lt"/>
                               </a:rPr>
                               <m:t>⊥</m:t>
                             </m:r>
                           </m:sub>
                         </m:sSub>
                         <m:r>
-                          <a:rPr lang="en-GB" b="0" i="1" smtClean="0">
-                            <a:latin typeface="Cambria Math" panose="02040503050406030204" pitchFamily="18" charset="0"/>
+                          <a:rPr lang="en-GB" sz="1800" b="0" i="1" smtClean="0">
+                            <a:latin typeface="+mn-lt"/>
                           </a:rPr>
                           <m:t>,</m:t>
                         </m:r>
                         <m:r>
-                          <a:rPr lang="en-GB" b="0" i="1" smtClean="0">
-                            <a:latin typeface="Cambria Math" panose="02040503050406030204" pitchFamily="18" charset="0"/>
+                          <a:rPr lang="en-GB" sz="1800" b="0" i="1" smtClean="0">
+                            <a:latin typeface="+mn-lt"/>
                           </a:rPr>
                           <m:t>𝑧</m:t>
                         </m:r>
@@ -7358,7 +8915,9 @@
                   </m:oMath>
                 </a14:m>
                 <a:r>
-                  <a:rPr lang="en-GB" dirty="0"/>
+                  <a:rPr lang="en-GB" sz="1800" dirty="0">
+                    <a:latin typeface="+mn-lt"/>
+                  </a:rPr>
                   <a:t> is the reciprocal-space electric field amplitude in the frequency domain</a:t>
                 </a:r>
               </a:p>
@@ -7369,23 +8928,23 @@
                     <m:sSub>
                       <m:sSubPr>
                         <m:ctrlPr>
-                          <a:rPr lang="en-GB" b="1" i="1" smtClean="0">
-                            <a:latin typeface="Cambria Math" panose="02040503050406030204" pitchFamily="18" charset="0"/>
+                          <a:rPr lang="en-GB" sz="1800" b="1" i="1" smtClean="0">
+                            <a:latin typeface="+mn-lt"/>
                           </a:rPr>
                         </m:ctrlPr>
                       </m:sSubPr>
                       <m:e>
                         <m:r>
-                          <a:rPr lang="en-GB" b="1" i="1" smtClean="0">
-                            <a:latin typeface="Cambria Math" panose="02040503050406030204" pitchFamily="18" charset="0"/>
+                          <a:rPr lang="en-GB" sz="1800" b="1" i="1" smtClean="0">
+                            <a:latin typeface="+mn-lt"/>
                           </a:rPr>
                           <m:t>𝒌</m:t>
                         </m:r>
                       </m:e>
                       <m:sub>
                         <m:r>
-                          <a:rPr lang="en-GB" b="1" i="1" smtClean="0">
-                            <a:latin typeface="Cambria Math" panose="02040503050406030204" pitchFamily="18" charset="0"/>
+                          <a:rPr lang="en-GB" sz="1800" b="1" i="1" smtClean="0">
+                            <a:latin typeface="+mn-lt"/>
                           </a:rPr>
                           <m:t>⊥</m:t>
                         </m:r>
@@ -7394,7 +8953,9 @@
                   </m:oMath>
                 </a14:m>
                 <a:r>
-                  <a:rPr lang="en-GB" dirty="0"/>
+                  <a:rPr lang="en-GB" sz="1800" dirty="0">
+                    <a:latin typeface="+mn-lt"/>
+                  </a:rPr>
                   <a:t> is the transverse spatial frequency vector</a:t>
                 </a:r>
               </a:p>
@@ -7406,15 +8967,15 @@
                       <m:accPr>
                         <m:chr m:val="̂"/>
                         <m:ctrlPr>
-                          <a:rPr lang="en-GB" sz="2000" b="0" i="1" smtClean="0">
-                            <a:latin typeface="Cambria Math" panose="02040503050406030204" pitchFamily="18" charset="0"/>
+                          <a:rPr lang="en-GB" sz="1800" b="0" i="1" smtClean="0">
+                            <a:latin typeface="+mn-lt"/>
                           </a:rPr>
                         </m:ctrlPr>
                       </m:accPr>
                       <m:e>
                         <m:r>
-                          <a:rPr lang="en-GB" sz="2000" b="0" i="1" smtClean="0">
-                            <a:latin typeface="Cambria Math" panose="02040503050406030204" pitchFamily="18" charset="0"/>
+                          <a:rPr lang="en-GB" sz="1800" b="0" i="1" smtClean="0">
+                            <a:latin typeface="+mn-lt"/>
                           </a:rPr>
                           <m:t>𝐿</m:t>
                         </m:r>
@@ -7423,120 +8984,120 @@
                     <m:d>
                       <m:dPr>
                         <m:ctrlPr>
-                          <a:rPr lang="en-GB" sz="2000" b="0" i="1" smtClean="0">
-                            <a:latin typeface="Cambria Math" panose="02040503050406030204" pitchFamily="18" charset="0"/>
+                          <a:rPr lang="en-GB" sz="1800" b="0" i="1" smtClean="0">
+                            <a:latin typeface="+mn-lt"/>
                           </a:rPr>
                         </m:ctrlPr>
                       </m:dPr>
                       <m:e>
                         <m:r>
-                          <a:rPr lang="en-GB" sz="2000" b="0" i="1" smtClean="0">
-                            <a:latin typeface="Cambria Math" panose="02040503050406030204" pitchFamily="18" charset="0"/>
+                          <a:rPr lang="en-GB" sz="1800" b="0" i="1" smtClean="0">
+                            <a:latin typeface="+mn-lt"/>
                           </a:rPr>
                           <m:t>𝜔</m:t>
                         </m:r>
                         <m:r>
-                          <a:rPr lang="en-GB" sz="2000" b="0" i="1" smtClean="0">
-                            <a:latin typeface="Cambria Math" panose="02040503050406030204" pitchFamily="18" charset="0"/>
+                          <a:rPr lang="en-GB" sz="1800" b="0" i="1" smtClean="0">
+                            <a:latin typeface="+mn-lt"/>
                           </a:rPr>
                           <m:t>,</m:t>
                         </m:r>
                         <m:r>
-                          <a:rPr lang="en-GB" sz="2000" b="0" i="1" smtClean="0">
-                            <a:latin typeface="Cambria Math" panose="02040503050406030204" pitchFamily="18" charset="0"/>
+                          <a:rPr lang="en-GB" sz="1800" b="0" i="1" smtClean="0">
+                            <a:latin typeface="+mn-lt"/>
                           </a:rPr>
                           <m:t>𝑧</m:t>
                         </m:r>
                       </m:e>
                     </m:d>
                     <m:r>
-                      <a:rPr lang="en-GB" sz="2000" b="0" i="1" smtClean="0">
-                        <a:latin typeface="Cambria Math" panose="02040503050406030204" pitchFamily="18" charset="0"/>
+                      <a:rPr lang="en-GB" sz="1800" b="0" i="1" smtClean="0">
+                        <a:latin typeface="+mn-lt"/>
                       </a:rPr>
                       <m:t>=</m:t>
                     </m:r>
                     <m:r>
-                      <a:rPr lang="en-GB" sz="2000" b="0" i="1" smtClean="0">
-                        <a:latin typeface="Cambria Math" panose="02040503050406030204" pitchFamily="18" charset="0"/>
+                      <a:rPr lang="en-GB" sz="1800" b="0" i="1" smtClean="0">
+                        <a:latin typeface="+mn-lt"/>
                       </a:rPr>
                       <m:t>𝑖</m:t>
                     </m:r>
                     <m:r>
-                      <a:rPr lang="en-GB" sz="2000" b="0" i="1" smtClean="0">
-                        <a:latin typeface="Cambria Math" panose="02040503050406030204" pitchFamily="18" charset="0"/>
+                      <a:rPr lang="en-GB" sz="1800" b="0" i="1" smtClean="0">
+                        <a:latin typeface="+mn-lt"/>
                       </a:rPr>
                       <m:t> </m:t>
                     </m:r>
                     <m:d>
                       <m:dPr>
                         <m:ctrlPr>
-                          <a:rPr lang="en-GB" sz="2000" b="0" i="1" smtClean="0">
-                            <a:latin typeface="Cambria Math" panose="02040503050406030204" pitchFamily="18" charset="0"/>
+                          <a:rPr lang="en-GB" sz="1800" b="0" i="1" smtClean="0">
+                            <a:latin typeface="+mn-lt"/>
                           </a:rPr>
                         </m:ctrlPr>
                       </m:dPr>
                       <m:e>
                         <m:r>
-                          <a:rPr lang="en-GB" sz="2000" b="0" i="1" smtClean="0">
-                            <a:latin typeface="Cambria Math" panose="02040503050406030204" pitchFamily="18" charset="0"/>
+                          <a:rPr lang="en-GB" sz="1800" b="0" i="1" smtClean="0">
+                            <a:latin typeface="+mn-lt"/>
                           </a:rPr>
                           <m:t>𝛽</m:t>
                         </m:r>
                         <m:d>
                           <m:dPr>
                             <m:ctrlPr>
-                              <a:rPr lang="en-GB" sz="2000" b="0" i="1" smtClean="0">
-                                <a:latin typeface="Cambria Math" panose="02040503050406030204" pitchFamily="18" charset="0"/>
+                              <a:rPr lang="en-GB" sz="1800" b="0" i="1" smtClean="0">
+                                <a:latin typeface="+mn-lt"/>
                               </a:rPr>
                             </m:ctrlPr>
                           </m:dPr>
                           <m:e>
                             <m:r>
-                              <a:rPr lang="en-GB" sz="2000" b="0" i="1" smtClean="0">
-                                <a:latin typeface="Cambria Math" panose="02040503050406030204" pitchFamily="18" charset="0"/>
+                              <a:rPr lang="en-GB" sz="1800" b="0" i="1" smtClean="0">
+                                <a:latin typeface="+mn-lt"/>
                               </a:rPr>
                               <m:t>𝜔</m:t>
                             </m:r>
                             <m:r>
-                              <a:rPr lang="en-GB" sz="2000" b="0" i="1" smtClean="0">
-                                <a:latin typeface="Cambria Math" panose="02040503050406030204" pitchFamily="18" charset="0"/>
+                              <a:rPr lang="en-GB" sz="1800" b="0" i="1" smtClean="0">
+                                <a:latin typeface="+mn-lt"/>
                               </a:rPr>
                               <m:t>, </m:t>
                             </m:r>
                             <m:r>
-                              <a:rPr lang="en-GB" sz="2000" b="0" i="1" smtClean="0">
-                                <a:latin typeface="Cambria Math" panose="02040503050406030204" pitchFamily="18" charset="0"/>
+                              <a:rPr lang="en-GB" sz="1800" b="0" i="1" smtClean="0">
+                                <a:latin typeface="+mn-lt"/>
                               </a:rPr>
                               <m:t>𝑧</m:t>
                             </m:r>
                           </m:e>
                         </m:d>
                         <m:r>
-                          <a:rPr lang="en-GB" sz="2000" b="0" i="1" smtClean="0">
-                            <a:latin typeface="Cambria Math" panose="02040503050406030204" pitchFamily="18" charset="0"/>
+                          <a:rPr lang="en-GB" sz="1800" b="0" i="1" smtClean="0">
+                            <a:latin typeface="+mn-lt"/>
                           </a:rPr>
                           <m:t>−</m:t>
                         </m:r>
                         <m:f>
                           <m:fPr>
                             <m:ctrlPr>
-                              <a:rPr lang="en-GB" sz="2000" b="0" i="1" smtClean="0">
-                                <a:latin typeface="Cambria Math" panose="02040503050406030204" pitchFamily="18" charset="0"/>
+                              <a:rPr lang="en-GB" sz="1800" b="0" i="1" smtClean="0">
+                                <a:latin typeface="+mn-lt"/>
                               </a:rPr>
                             </m:ctrlPr>
                           </m:fPr>
                           <m:num>
                             <m:r>
-                              <a:rPr lang="en-GB" sz="2000" b="0" i="1" smtClean="0">
-                                <a:latin typeface="Cambria Math" panose="02040503050406030204" pitchFamily="18" charset="0"/>
+                              <a:rPr lang="en-GB" sz="1800" b="0" i="1" smtClean="0">
+                                <a:latin typeface="+mn-lt"/>
                               </a:rPr>
                               <m:t>𝜔</m:t>
                             </m:r>
                           </m:num>
                           <m:den>
                             <m:r>
-                              <a:rPr lang="en-GB" sz="2000" b="0" i="1" smtClean="0">
-                                <a:latin typeface="Cambria Math" panose="02040503050406030204" pitchFamily="18" charset="0"/>
+                              <a:rPr lang="en-GB" sz="1800" b="0" i="1" smtClean="0">
+                                <a:latin typeface="+mn-lt"/>
                               </a:rPr>
                               <m:t>𝑣</m:t>
                             </m:r>
@@ -7545,76 +9106,78 @@
                       </m:e>
                     </m:d>
                     <m:r>
-                      <a:rPr lang="en-GB" sz="2000" b="0" i="1" smtClean="0">
-                        <a:latin typeface="Cambria Math" panose="02040503050406030204" pitchFamily="18" charset="0"/>
+                      <a:rPr lang="en-GB" sz="1800" b="0" i="1" smtClean="0">
+                        <a:latin typeface="+mn-lt"/>
                       </a:rPr>
                       <m:t>−</m:t>
                     </m:r>
                     <m:f>
                       <m:fPr>
                         <m:ctrlPr>
-                          <a:rPr lang="en-GB" sz="2000" b="0" i="1" smtClean="0">
-                            <a:latin typeface="Cambria Math" panose="02040503050406030204" pitchFamily="18" charset="0"/>
+                          <a:rPr lang="en-GB" sz="1800" b="0" i="1" smtClean="0">
+                            <a:latin typeface="+mn-lt"/>
                           </a:rPr>
                         </m:ctrlPr>
                       </m:fPr>
                       <m:num>
                         <m:r>
-                          <a:rPr lang="en-GB" sz="2000" b="0" i="1" smtClean="0">
-                            <a:latin typeface="Cambria Math" panose="02040503050406030204" pitchFamily="18" charset="0"/>
+                          <a:rPr lang="en-GB" sz="1800" b="0" i="1" smtClean="0">
+                            <a:latin typeface="+mn-lt"/>
                           </a:rPr>
                           <m:t>1</m:t>
                         </m:r>
                       </m:num>
                       <m:den>
                         <m:r>
-                          <a:rPr lang="en-GB" sz="2000" b="0" i="1" smtClean="0">
-                            <a:latin typeface="Cambria Math" panose="02040503050406030204" pitchFamily="18" charset="0"/>
+                          <a:rPr lang="en-GB" sz="1800" b="0" i="1" smtClean="0">
+                            <a:latin typeface="+mn-lt"/>
                           </a:rPr>
                           <m:t>2</m:t>
                         </m:r>
                       </m:den>
                     </m:f>
                     <m:r>
-                      <a:rPr lang="en-GB" sz="2000" b="0" i="1" smtClean="0">
-                        <a:latin typeface="Cambria Math" panose="02040503050406030204" pitchFamily="18" charset="0"/>
+                      <a:rPr lang="en-GB" sz="1800" b="0" i="1" smtClean="0">
+                        <a:latin typeface="+mn-lt"/>
                       </a:rPr>
                       <m:t>𝛼</m:t>
                     </m:r>
                     <m:r>
-                      <a:rPr lang="en-GB" sz="2000" b="0" i="1" smtClean="0">
-                        <a:latin typeface="Cambria Math" panose="02040503050406030204" pitchFamily="18" charset="0"/>
+                      <a:rPr lang="en-GB" sz="1800" b="0" i="1" smtClean="0">
+                        <a:latin typeface="+mn-lt"/>
                       </a:rPr>
                       <m:t>(</m:t>
                     </m:r>
                     <m:r>
-                      <a:rPr lang="en-GB" sz="2000" b="0" i="1" smtClean="0">
-                        <a:latin typeface="Cambria Math" panose="02040503050406030204" pitchFamily="18" charset="0"/>
+                      <a:rPr lang="en-GB" sz="1800" b="0" i="1" smtClean="0">
+                        <a:latin typeface="+mn-lt"/>
                       </a:rPr>
                       <m:t>𝜔</m:t>
                     </m:r>
                     <m:r>
-                      <a:rPr lang="en-GB" sz="2000" b="0" i="1" smtClean="0">
-                        <a:latin typeface="Cambria Math" panose="02040503050406030204" pitchFamily="18" charset="0"/>
+                      <a:rPr lang="en-GB" sz="1800" b="0" i="1" smtClean="0">
+                        <a:latin typeface="+mn-lt"/>
                       </a:rPr>
                       <m:t>,</m:t>
                     </m:r>
                     <m:r>
-                      <a:rPr lang="en-GB" sz="2000" b="0" i="1" smtClean="0">
-                        <a:latin typeface="Cambria Math" panose="02040503050406030204" pitchFamily="18" charset="0"/>
+                      <a:rPr lang="en-GB" sz="1800" b="0" i="1" smtClean="0">
+                        <a:latin typeface="+mn-lt"/>
                       </a:rPr>
                       <m:t>𝑧</m:t>
                     </m:r>
                     <m:r>
-                      <a:rPr lang="en-GB" sz="2000" b="0" i="1" smtClean="0">
-                        <a:latin typeface="Cambria Math" panose="02040503050406030204" pitchFamily="18" charset="0"/>
+                      <a:rPr lang="en-GB" sz="1800" b="0" i="1" smtClean="0">
+                        <a:latin typeface="+mn-lt"/>
                       </a:rPr>
                       <m:t>)</m:t>
                     </m:r>
                   </m:oMath>
                 </a14:m>
                 <a:r>
-                  <a:rPr lang="en-GB" dirty="0"/>
+                  <a:rPr lang="en-GB" sz="1800" dirty="0">
+                    <a:latin typeface="+mn-lt"/>
+                  </a:rPr>
                   <a:t> is a linear operator describing dispersion and absorption </a:t>
                 </a:r>
               </a:p>
@@ -7623,15 +9186,17 @@
                 <a14:m>
                   <m:oMath xmlns:m="http://schemas.openxmlformats.org/officeDocument/2006/math">
                     <m:r>
-                      <a:rPr lang="en-GB" sz="2000" b="0" i="1" smtClean="0">
-                        <a:latin typeface="Cambria Math" panose="02040503050406030204" pitchFamily="18" charset="0"/>
+                      <a:rPr lang="en-GB" sz="1800" b="0" i="1" smtClean="0">
+                        <a:latin typeface="+mn-lt"/>
                       </a:rPr>
                       <m:t>𝑁</m:t>
                     </m:r>
                   </m:oMath>
                 </a14:m>
                 <a:r>
-                  <a:rPr lang="en-GB" dirty="0"/>
+                  <a:rPr lang="en-GB" sz="1800" dirty="0">
+                    <a:latin typeface="+mn-lt"/>
+                  </a:rPr>
                   <a:t> is a normalisation factor</a:t>
                 </a:r>
               </a:p>
@@ -7642,23 +9207,23 @@
                     <m:sSup>
                       <m:sSupPr>
                         <m:ctrlPr>
-                          <a:rPr lang="en-GB" sz="2000" b="1" i="1" smtClean="0">
-                            <a:latin typeface="Cambria Math" panose="02040503050406030204" pitchFamily="18" charset="0"/>
+                          <a:rPr lang="en-GB" sz="1800" b="1" i="1" smtClean="0">
+                            <a:latin typeface="+mn-lt"/>
                           </a:rPr>
                         </m:ctrlPr>
                       </m:sSupPr>
                       <m:e>
                         <m:r>
-                          <a:rPr lang="en-GB" sz="2000" b="1" i="1" smtClean="0">
-                            <a:latin typeface="Cambria Math" panose="02040503050406030204" pitchFamily="18" charset="0"/>
+                          <a:rPr lang="en-GB" sz="1800" b="1" i="1" smtClean="0">
+                            <a:latin typeface="+mn-lt"/>
                           </a:rPr>
                           <m:t>𝑷</m:t>
                         </m:r>
                       </m:e>
                       <m:sup>
                         <m:r>
-                          <a:rPr lang="en-GB" sz="2000" b="0" i="1" smtClean="0">
-                            <a:latin typeface="Cambria Math" panose="02040503050406030204" pitchFamily="18" charset="0"/>
+                          <a:rPr lang="en-GB" sz="1800" b="0" i="1" smtClean="0">
+                            <a:latin typeface="+mn-lt"/>
                           </a:rPr>
                           <m:t>𝑁𝐿</m:t>
                         </m:r>
@@ -7667,8 +9232,8 @@
                     <m:d>
                       <m:dPr>
                         <m:ctrlPr>
-                          <a:rPr lang="en-GB" sz="2000" i="1">
-                            <a:latin typeface="Cambria Math" panose="02040503050406030204" pitchFamily="18" charset="0"/>
+                          <a:rPr lang="en-GB" sz="1800" i="1">
+                            <a:latin typeface="+mn-lt"/>
                           </a:rPr>
                         </m:ctrlPr>
                       </m:dPr>
@@ -7677,51 +9242,51 @@
                           <m:rPr>
                             <m:sty m:val="p"/>
                           </m:rPr>
-                          <a:rPr lang="en-GB" sz="2000" i="1">
-                            <a:latin typeface="Cambria Math" panose="02040503050406030204" pitchFamily="18" charset="0"/>
+                          <a:rPr lang="en-GB" sz="1800" i="1">
+                            <a:latin typeface="+mn-lt"/>
                           </a:rPr>
                           <m:t>ω</m:t>
                         </m:r>
                         <m:r>
-                          <a:rPr lang="en-GB" sz="2000" i="1">
-                            <a:latin typeface="Cambria Math" panose="02040503050406030204" pitchFamily="18" charset="0"/>
+                          <a:rPr lang="en-GB" sz="1800" i="1">
+                            <a:latin typeface="+mn-lt"/>
                           </a:rPr>
                           <m:t>, </m:t>
                         </m:r>
                         <m:sSub>
                           <m:sSubPr>
                             <m:ctrlPr>
-                              <a:rPr lang="en-GB" sz="2000" b="1" i="1">
-                                <a:latin typeface="Cambria Math" panose="02040503050406030204" pitchFamily="18" charset="0"/>
+                              <a:rPr lang="en-GB" sz="1800" b="1" i="1">
+                                <a:latin typeface="+mn-lt"/>
                               </a:rPr>
                             </m:ctrlPr>
                           </m:sSubPr>
                           <m:e>
                             <m:r>
-                              <a:rPr lang="en-GB" sz="2000" b="1" i="1" smtClean="0">
-                                <a:latin typeface="Cambria Math" panose="02040503050406030204" pitchFamily="18" charset="0"/>
+                              <a:rPr lang="en-GB" sz="1800" b="1" i="1" smtClean="0">
+                                <a:latin typeface="+mn-lt"/>
                               </a:rPr>
                               <m:t>𝒌</m:t>
                             </m:r>
                           </m:e>
                           <m:sub>
                             <m:r>
-                              <a:rPr lang="en-GB" sz="2000" b="1" i="1">
-                                <a:latin typeface="Cambria Math" panose="02040503050406030204" pitchFamily="18" charset="0"/>
+                              <a:rPr lang="en-GB" sz="1800" b="1" i="1">
+                                <a:latin typeface="+mn-lt"/>
                               </a:rPr>
                               <m:t>⊥</m:t>
                             </m:r>
                           </m:sub>
                         </m:sSub>
                         <m:r>
-                          <a:rPr lang="en-GB" sz="2000" i="1">
-                            <a:latin typeface="Cambria Math" panose="02040503050406030204" pitchFamily="18" charset="0"/>
+                          <a:rPr lang="en-GB" sz="1800" i="1">
+                            <a:latin typeface="+mn-lt"/>
                           </a:rPr>
                           <m:t>,</m:t>
                         </m:r>
                         <m:r>
-                          <a:rPr lang="en-GB" sz="2000" i="1">
-                            <a:latin typeface="Cambria Math" panose="02040503050406030204" pitchFamily="18" charset="0"/>
+                          <a:rPr lang="en-GB" sz="1800" i="1">
+                            <a:latin typeface="+mn-lt"/>
                           </a:rPr>
                           <m:t>𝑧</m:t>
                         </m:r>
@@ -7730,14 +9295,24 @@
                   </m:oMath>
                 </a14:m>
                 <a:r>
-                  <a:rPr lang="en-GB" dirty="0"/>
+                  <a:rPr lang="en-GB" sz="1800" dirty="0">
+                    <a:latin typeface="+mn-lt"/>
+                  </a:rPr>
                   <a:t> is the reciprocal-space nonlinear polarisation response in the frequency domain  </a:t>
                 </a:r>
               </a:p>
               <a:p>
                 <a:r>
-                  <a:rPr lang="en-GB" dirty="0"/>
-                  <a:t>A Hankel transform is used to transform into reciprocal space, assuming radial symmetry 	</a:t>
+                  <a:rPr lang="en-GB" sz="2600" dirty="0">
+                    <a:latin typeface="+mn-lt"/>
+                  </a:rPr>
+                  <a:t>A Hankel transform is used to transform into reciprocal space, assuming radial symmetry </a:t>
+                </a:r>
+                <a:r>
+                  <a:rPr lang="en-GB" dirty="0">
+                    <a:latin typeface="+mn-lt"/>
+                  </a:rPr>
+                  <a:t>	</a:t>
                 </a:r>
               </a:p>
             </p:txBody>
@@ -7761,10 +9336,14 @@
               </p:nvPr>
             </p:nvSpPr>
             <p:spPr>
+              <a:xfrm>
+                <a:off x="410092" y="1337187"/>
+                <a:ext cx="11375640" cy="5083278"/>
+              </a:xfrm>
               <a:blipFill>
                 <a:blip r:embed="rId3"/>
                 <a:stretch>
-                  <a:fillRect l="-1661" t="-2920"/>
+                  <a:fillRect l="-1608" t="-2758"/>
                 </a:stretch>
               </a:blipFill>
             </p:spPr>
@@ -7799,7 +9378,7 @@
             </p:nvSpPr>
             <p:spPr>
               <a:xfrm>
-                <a:off x="2245991" y="2732207"/>
+                <a:off x="2334481" y="2653896"/>
                 <a:ext cx="7232306" cy="702244"/>
               </a:xfrm>
               <a:prstGeom prst="rect">
@@ -7813,6 +9392,7 @@
               </a:bodyPr>
               <a:lstStyle/>
               <a:p>
+                <a:pPr/>
                 <a14:m>
                   <m:oMathPara xmlns:m="http://schemas.openxmlformats.org/officeDocument/2006/math">
                     <m:oMathParaPr>
@@ -8203,7 +9783,7 @@
             </p:nvSpPr>
             <p:spPr>
               <a:xfrm>
-                <a:off x="2245991" y="2732207"/>
+                <a:off x="2334481" y="2653896"/>
                 <a:ext cx="7232306" cy="702244"/>
               </a:xfrm>
               <a:prstGeom prst="rect">
@@ -8245,7 +9825,7 @@
         </p:nvSpPr>
         <p:spPr>
           <a:xfrm>
-            <a:off x="10350222" y="2852496"/>
+            <a:off x="9996260" y="2653896"/>
             <a:ext cx="561372" cy="461665"/>
           </a:xfrm>
           <a:prstGeom prst="rect">
@@ -8324,9 +9904,37 @@
                 </a:solidFill>
                 <a:latin typeface="Arial"/>
               </a:rPr>
-              <a:t>Background</a:t>
+              <a:t>2. Background</a:t>
             </a:r>
             <a:endParaRPr lang="en-GB" dirty="0"/>
+          </a:p>
+        </p:txBody>
+      </p:sp>
+      <p:sp>
+        <p:nvSpPr>
+          <p:cNvPr id="4" name="Footer Placeholder 3">
+            <a:extLst>
+              <a:ext uri="{FF2B5EF4-FFF2-40B4-BE49-F238E27FC236}">
+                <a16:creationId xmlns:a16="http://schemas.microsoft.com/office/drawing/2014/main" id="{F7BC2DFE-E94C-C64C-8AF0-3AFC66ACB571}"/>
+              </a:ext>
+            </a:extLst>
+          </p:cNvPr>
+          <p:cNvSpPr>
+            <a:spLocks noGrp="1"/>
+          </p:cNvSpPr>
+          <p:nvPr>
+            <p:ph type="ftr" idx="1"/>
+          </p:nvPr>
+        </p:nvSpPr>
+        <p:spPr/>
+        <p:txBody>
+          <a:bodyPr/>
+          <a:lstStyle/>
+          <a:p>
+            <a:r>
+              <a:rPr lang="en-GB"/>
+              <a:t>| Project Presentation | David Amorim, 04.09.2023 </a:t>
+            </a:r>
           </a:p>
         </p:txBody>
       </p:sp>
@@ -8351,18 +9959,18 @@
             <p:spPr/>
             <p:txBody>
               <a:bodyPr>
-                <a:normAutofit fontScale="77500" lnSpcReduction="20000"/>
+                <a:normAutofit fontScale="85000" lnSpcReduction="20000"/>
               </a:bodyPr>
               <a:lstStyle/>
               <a:p>
                 <a:r>
-                  <a:rPr lang="en-GB" sz="3400" dirty="0"/>
+                  <a:rPr lang="en-GB" sz="3100" dirty="0"/>
                   <a:t>The UPPE is derived directly from Maxwell’s Equations without using a  slowly-varying envelope approximation [2]</a:t>
                 </a:r>
               </a:p>
               <a:p>
                 <a:r>
-                  <a:rPr lang="en-GB" sz="3400" dirty="0"/>
+                  <a:rPr lang="en-GB" sz="3100" dirty="0"/>
                   <a:t>The nonlinear polarisation response considers the Kerr effect as well as photo-ionisation: </a:t>
                 </a:r>
                 <a14:m>
@@ -8370,14 +9978,14 @@
                     <m:sSup>
                       <m:sSupPr>
                         <m:ctrlPr>
-                          <a:rPr lang="en-GB" sz="3400" b="0" i="1" smtClean="0">
+                          <a:rPr lang="en-GB" sz="3100" b="0" i="1" smtClean="0">
                             <a:latin typeface="Cambria Math" panose="02040503050406030204" pitchFamily="18" charset="0"/>
                           </a:rPr>
                         </m:ctrlPr>
                       </m:sSupPr>
                       <m:e>
                         <m:r>
-                          <a:rPr lang="en-GB" sz="3400" b="1" i="1" smtClean="0">
+                          <a:rPr lang="en-GB" sz="3100" b="1" i="1" smtClean="0">
                             <a:latin typeface="Cambria Math" panose="02040503050406030204" pitchFamily="18" charset="0"/>
                           </a:rPr>
                           <m:t>𝑷</m:t>
@@ -8385,7 +9993,7 @@
                       </m:e>
                       <m:sup>
                         <m:r>
-                          <a:rPr lang="en-GB" sz="3400" b="0" i="1" smtClean="0">
+                          <a:rPr lang="en-GB" sz="3100" b="0" i="1" smtClean="0">
                             <a:latin typeface="Cambria Math" panose="02040503050406030204" pitchFamily="18" charset="0"/>
                           </a:rPr>
                           <m:t>𝑁𝐿</m:t>
@@ -8393,7 +10001,7 @@
                       </m:sup>
                     </m:sSup>
                     <m:r>
-                      <a:rPr lang="en-GB" sz="3400" b="0" i="1" smtClean="0">
+                      <a:rPr lang="en-GB" sz="3100" b="0" i="1" smtClean="0">
                         <a:latin typeface="Cambria Math" panose="02040503050406030204" pitchFamily="18" charset="0"/>
                       </a:rPr>
                       <m:t>=</m:t>
@@ -8401,14 +10009,14 @@
                     <m:sSup>
                       <m:sSupPr>
                         <m:ctrlPr>
-                          <a:rPr lang="en-GB" sz="3400" b="0" i="1" smtClean="0">
+                          <a:rPr lang="en-GB" sz="3100" b="0" i="1" smtClean="0">
                             <a:latin typeface="Cambria Math" panose="02040503050406030204" pitchFamily="18" charset="0"/>
                           </a:rPr>
                         </m:ctrlPr>
                       </m:sSupPr>
                       <m:e>
                         <m:r>
-                          <a:rPr lang="en-GB" sz="3400" b="1" i="1" smtClean="0">
+                          <a:rPr lang="en-GB" sz="3100" b="1" i="1" smtClean="0">
                             <a:latin typeface="Cambria Math" panose="02040503050406030204" pitchFamily="18" charset="0"/>
                           </a:rPr>
                           <m:t>𝑷</m:t>
@@ -8416,7 +10024,7 @@
                       </m:e>
                       <m:sup>
                         <m:r>
-                          <a:rPr lang="en-GB" sz="3400" b="0" i="1" smtClean="0">
+                          <a:rPr lang="en-GB" sz="3100" b="0" i="1" smtClean="0">
                             <a:latin typeface="Cambria Math" panose="02040503050406030204" pitchFamily="18" charset="0"/>
                           </a:rPr>
                           <m:t>𝐾𝑒𝑟𝑟</m:t>
@@ -8424,7 +10032,7 @@
                       </m:sup>
                     </m:sSup>
                     <m:r>
-                      <a:rPr lang="en-GB" sz="3400" b="0" i="1" smtClean="0">
+                      <a:rPr lang="en-GB" sz="3100" b="0" i="1" smtClean="0">
                         <a:latin typeface="Cambria Math" panose="02040503050406030204" pitchFamily="18" charset="0"/>
                       </a:rPr>
                       <m:t>+</m:t>
@@ -8432,14 +10040,14 @@
                     <m:sSup>
                       <m:sSupPr>
                         <m:ctrlPr>
-                          <a:rPr lang="en-GB" sz="3400" b="0" i="1" smtClean="0">
+                          <a:rPr lang="en-GB" sz="3100" b="0" i="1" smtClean="0">
                             <a:latin typeface="Cambria Math" panose="02040503050406030204" pitchFamily="18" charset="0"/>
                           </a:rPr>
                         </m:ctrlPr>
                       </m:sSupPr>
                       <m:e>
                         <m:r>
-                          <a:rPr lang="en-GB" sz="3400" b="1" i="1" smtClean="0">
+                          <a:rPr lang="en-GB" sz="3100" b="1" i="1" smtClean="0">
                             <a:latin typeface="Cambria Math" panose="02040503050406030204" pitchFamily="18" charset="0"/>
                           </a:rPr>
                           <m:t>𝑷</m:t>
@@ -8447,7 +10055,7 @@
                       </m:e>
                       <m:sup>
                         <m:r>
-                          <a:rPr lang="en-GB" sz="3400" b="0" i="1" smtClean="0">
+                          <a:rPr lang="en-GB" sz="3100" b="0" i="1" smtClean="0">
                             <a:latin typeface="Cambria Math" panose="02040503050406030204" pitchFamily="18" charset="0"/>
                           </a:rPr>
                           <m:t>𝑖𝑜𝑛</m:t>
@@ -8457,7 +10065,7 @@
                   </m:oMath>
                 </a14:m>
                 <a:r>
-                  <a:rPr lang="en-GB" sz="3400" dirty="0"/>
+                  <a:rPr lang="en-GB" sz="3100" dirty="0"/>
                   <a:t>, with</a:t>
                 </a:r>
               </a:p>
@@ -8496,12 +10104,6 @@
                   <a:buNone/>
                 </a:pPr>
                 <a:endParaRPr lang="en-GB" dirty="0"/>
-              </a:p>
-              <a:p>
-                <a:pPr marL="0" indent="0">
-                  <a:buNone/>
-                </a:pPr>
-                <a:endParaRPr lang="en-GB" sz="2600" dirty="0"/>
               </a:p>
               <a:p>
                 <a:pPr marL="0" indent="0">
@@ -8679,7 +10281,7 @@
               <a:blipFill>
                 <a:blip r:embed="rId2"/>
                 <a:stretch>
-                  <a:fillRect l="-1661" t="-4380" b="-2433"/>
+                  <a:fillRect l="-1661" t="-4380" r="-482" b="-365"/>
                 </a:stretch>
               </a:blipFill>
             </p:spPr>
@@ -8698,36 +10300,8 @@
           </p:sp>
         </mc:Fallback>
       </mc:AlternateContent>
-      <p:sp>
-        <p:nvSpPr>
-          <p:cNvPr id="4" name="Footer Placeholder 3">
-            <a:extLst>
-              <a:ext uri="{FF2B5EF4-FFF2-40B4-BE49-F238E27FC236}">
-                <a16:creationId xmlns:a16="http://schemas.microsoft.com/office/drawing/2014/main" id="{F7BC2DFE-E94C-C64C-8AF0-3AFC66ACB571}"/>
-              </a:ext>
-            </a:extLst>
-          </p:cNvPr>
-          <p:cNvSpPr>
-            <a:spLocks noGrp="1"/>
-          </p:cNvSpPr>
-          <p:nvPr>
-            <p:ph type="ftr" idx="1"/>
-          </p:nvPr>
-        </p:nvSpPr>
-        <p:spPr/>
-        <p:txBody>
-          <a:bodyPr/>
-          <a:lstStyle/>
-          <a:p>
-            <a:r>
-              <a:rPr lang="en-GB"/>
-              <a:t>| Project Presentation | David Amorim, 04.09.2023 </a:t>
-            </a:r>
-          </a:p>
-        </p:txBody>
-      </p:sp>
-      <mc:AlternateContent xmlns:mc="http://schemas.openxmlformats.org/markup-compatibility/2006">
-        <mc:Choice xmlns:a14="http://schemas.microsoft.com/office/drawing/2010/main" Requires="a14">
+      <mc:AlternateContent xmlns:mc="http://schemas.openxmlformats.org/markup-compatibility/2006" xmlns:a14="http://schemas.microsoft.com/office/drawing/2010/main">
+        <mc:Choice Requires="a14">
           <p:sp>
             <p:nvSpPr>
               <p:cNvPr id="6" name="TextBox 5">
@@ -8756,6 +10330,7 @@
               </a:bodyPr>
               <a:lstStyle/>
               <a:p>
+                <a:pPr/>
                 <a14:m>
                   <m:oMathPara xmlns:m="http://schemas.openxmlformats.org/officeDocument/2006/math">
                     <m:oMathParaPr>
@@ -8996,7 +10571,7 @@
             </p:txBody>
           </p:sp>
         </mc:Choice>
-        <mc:Fallback>
+        <mc:Fallback xmlns="">
           <p:sp>
             <p:nvSpPr>
               <p:cNvPr id="6" name="TextBox 5">
@@ -9041,8 +10616,8 @@
           </p:sp>
         </mc:Fallback>
       </mc:AlternateContent>
-      <mc:AlternateContent xmlns:mc="http://schemas.openxmlformats.org/markup-compatibility/2006">
-        <mc:Choice xmlns:a14="http://schemas.microsoft.com/office/drawing/2010/main" Requires="a14">
+      <mc:AlternateContent xmlns:mc="http://schemas.openxmlformats.org/markup-compatibility/2006" xmlns:a14="http://schemas.microsoft.com/office/drawing/2010/main">
+        <mc:Choice Requires="a14">
           <p:sp>
             <p:nvSpPr>
               <p:cNvPr id="7" name="TextBox 6">
@@ -9071,6 +10646,7 @@
               </a:bodyPr>
               <a:lstStyle/>
               <a:p>
+                <a:pPr/>
                 <a14:m>
                   <m:oMathPara xmlns:m="http://schemas.openxmlformats.org/officeDocument/2006/math">
                     <m:oMathParaPr>
@@ -9459,7 +11035,13 @@
                             <a:rPr lang="en-GB" sz="2400" b="0" i="1" smtClean="0">
                               <a:latin typeface="Cambria Math" panose="02040503050406030204" pitchFamily="18" charset="0"/>
                             </a:rPr>
-                            <m:t>−∞ </m:t>
+                            <m:t>−</m:t>
+                          </m:r>
+                          <m:r>
+                            <a:rPr lang="en-GB" sz="2400" b="0" i="1" smtClean="0">
+                              <a:latin typeface="Cambria Math" panose="02040503050406030204" pitchFamily="18" charset="0"/>
+                            </a:rPr>
+                            <m:t>∞ </m:t>
                           </m:r>
                         </m:sub>
                         <m:sup>
@@ -9640,7 +11222,7 @@
             </p:txBody>
           </p:sp>
         </mc:Choice>
-        <mc:Fallback>
+        <mc:Fallback xmlns="">
           <p:sp>
             <p:nvSpPr>
               <p:cNvPr id="7" name="TextBox 6">
@@ -9685,8 +11267,8 @@
           </p:sp>
         </mc:Fallback>
       </mc:AlternateContent>
-      <mc:AlternateContent xmlns:mc="http://schemas.openxmlformats.org/markup-compatibility/2006">
-        <mc:Choice xmlns:a14="http://schemas.microsoft.com/office/drawing/2010/main" Requires="a14">
+      <mc:AlternateContent xmlns:mc="http://schemas.openxmlformats.org/markup-compatibility/2006" xmlns:a14="http://schemas.microsoft.com/office/drawing/2010/main">
+        <mc:Choice Requires="a14">
           <p:sp>
             <p:nvSpPr>
               <p:cNvPr id="8" name="TextBox 7">
@@ -9715,6 +11297,7 @@
               </a:bodyPr>
               <a:lstStyle/>
               <a:p>
+                <a:pPr/>
                 <a14:m>
                   <m:oMathPara xmlns:m="http://schemas.openxmlformats.org/officeDocument/2006/math">
                     <m:oMathParaPr>
@@ -9882,7 +11465,7 @@
             </p:txBody>
           </p:sp>
         </mc:Choice>
-        <mc:Fallback>
+        <mc:Fallback xmlns="">
           <p:sp>
             <p:nvSpPr>
               <p:cNvPr id="8" name="TextBox 7">
@@ -9976,7 +11559,7 @@
         </p:nvSpPr>
         <p:spPr>
           <a:xfrm>
-            <a:off x="11502834" y="3911400"/>
+            <a:off x="11384847" y="3911400"/>
             <a:ext cx="561372" cy="461665"/>
           </a:xfrm>
           <a:prstGeom prst="rect">
@@ -10062,6 +11645,42 @@
           <a:chExt cx="0" cy="0"/>
         </a:xfrm>
       </p:grpSpPr>
+      <p:pic>
+        <p:nvPicPr>
+          <p:cNvPr id="7" name="Picture 6" descr="A red line graph with numbers and a white background&#10;&#10;Description automatically generated">
+            <a:extLst>
+              <a:ext uri="{FF2B5EF4-FFF2-40B4-BE49-F238E27FC236}">
+                <a16:creationId xmlns:a16="http://schemas.microsoft.com/office/drawing/2014/main" id="{F36792CE-C286-307B-1D9A-BA7601D75520}"/>
+              </a:ext>
+            </a:extLst>
+          </p:cNvPr>
+          <p:cNvPicPr>
+            <a:picLocks noChangeAspect="1"/>
+          </p:cNvPicPr>
+          <p:nvPr/>
+        </p:nvPicPr>
+        <p:blipFill>
+          <a:blip r:embed="rId2" cstate="print">
+            <a:extLst>
+              <a:ext uri="{28A0092B-C50C-407E-A947-70E740481C1C}">
+                <a14:useLocalDpi xmlns:a14="http://schemas.microsoft.com/office/drawing/2010/main" val="0"/>
+              </a:ext>
+            </a:extLst>
+          </a:blip>
+          <a:stretch>
+            <a:fillRect/>
+          </a:stretch>
+        </p:blipFill>
+        <p:spPr>
+          <a:xfrm>
+            <a:off x="6519730" y="1084018"/>
+            <a:ext cx="5759817" cy="4319634"/>
+          </a:xfrm>
+          <a:prstGeom prst="rect">
+            <a:avLst/>
+          </a:prstGeom>
+        </p:spPr>
+      </p:pic>
       <p:sp>
         <p:nvSpPr>
           <p:cNvPr id="5" name="Title 4">
@@ -10090,7 +11709,25 @@
                 </a:solidFill>
                 <a:latin typeface="Arial"/>
               </a:rPr>
-              <a:t>Simulation Output</a:t>
+              <a:t>3. Simulation </a:t>
+            </a:r>
+            <a:r>
+              <a:rPr lang="en-US" b="1" spc="-1" dirty="0">
+                <a:solidFill>
+                  <a:srgbClr val="009FDF"/>
+                </a:solidFill>
+                <a:latin typeface="Arial"/>
+              </a:rPr>
+              <a:t>i</a:t>
+            </a:r>
+            <a:r>
+              <a:rPr lang="en-US" b="1" strike="noStrike" spc="-1" dirty="0">
+                <a:solidFill>
+                  <a:srgbClr val="009FDF"/>
+                </a:solidFill>
+                <a:latin typeface="Arial"/>
+              </a:rPr>
+              <a:t>nputs</a:t>
             </a:r>
             <a:endParaRPr lang="en-GB" dirty="0"/>
           </a:p>
@@ -10126,10 +11763,10 @@
       </p:sp>
       <p:sp>
         <p:nvSpPr>
-          <p:cNvPr id="6" name="Content Placeholder 5">
+          <p:cNvPr id="2" name="Content Placeholder 1">
             <a:extLst>
               <a:ext uri="{FF2B5EF4-FFF2-40B4-BE49-F238E27FC236}">
-                <a16:creationId xmlns:a16="http://schemas.microsoft.com/office/drawing/2014/main" id="{3893E9EB-A4D2-B90D-8568-9CFA2BC4AEE2}"/>
+                <a16:creationId xmlns:a16="http://schemas.microsoft.com/office/drawing/2014/main" id="{33F7CC5D-D6E8-E1BF-7FA1-5BE9F035E5D6}"/>
               </a:ext>
             </a:extLst>
           </p:cNvPr>
@@ -10140,12 +11777,112 @@
             <p:ph/>
           </p:nvPr>
         </p:nvSpPr>
-        <p:spPr/>
-        <p:txBody>
-          <a:bodyPr/>
-          <a:lstStyle/>
-          <a:p>
-            <a:endParaRPr lang="en-GB" dirty="0"/>
+        <p:spPr>
+          <a:xfrm>
+            <a:off x="407880" y="1406520"/>
+            <a:ext cx="5688120" cy="5009760"/>
+          </a:xfrm>
+        </p:spPr>
+        <p:txBody>
+          <a:bodyPr>
+            <a:normAutofit lnSpcReduction="10000"/>
+          </a:bodyPr>
+          <a:lstStyle/>
+          <a:p>
+            <a:r>
+              <a:rPr lang="en-GB" dirty="0"/>
+              <a:t>The simulation input was based on measured data, as far as possible:</a:t>
+            </a:r>
+          </a:p>
+          <a:p>
+            <a:pPr lvl="1"/>
+            <a:r>
+              <a:rPr lang="en-GB" dirty="0"/>
+              <a:t>Time-intensity data of the IR input beam (based on FROG) was fed in</a:t>
+            </a:r>
+          </a:p>
+          <a:p>
+            <a:pPr lvl="1"/>
+            <a:r>
+              <a:rPr lang="en-GB" dirty="0"/>
+              <a:t>The spatial profile of the input beam was assumed to be a Gaussian with beam waist 65</a:t>
+            </a:r>
+            <a:r>
+              <a:rPr lang="el-GR" dirty="0"/>
+              <a:t>μ</a:t>
+            </a:r>
+            <a:r>
+              <a:rPr lang="en-GB" dirty="0"/>
+              <a:t>m (based on measurement)</a:t>
+            </a:r>
+          </a:p>
+          <a:p>
+            <a:pPr lvl="1"/>
+            <a:r>
+              <a:rPr lang="en-GB" dirty="0"/>
+              <a:t>The gas density profile was based on COMSOL simulations of the gas cell (carried out by </a:t>
+            </a:r>
+            <a:r>
+              <a:rPr lang="en-GB" dirty="0" err="1"/>
+              <a:t>Josina</a:t>
+            </a:r>
+            <a:r>
+              <a:rPr lang="en-GB" dirty="0"/>
+              <a:t> Hahne and Agata </a:t>
+            </a:r>
+            <a:r>
+              <a:rPr lang="en-GB" dirty="0" err="1"/>
+              <a:t>Azzolin</a:t>
+            </a:r>
+            <a:r>
+              <a:rPr lang="en-GB" dirty="0"/>
+              <a:t>)</a:t>
+            </a:r>
+          </a:p>
+          <a:p>
+            <a:r>
+              <a:rPr lang="en-GB" dirty="0"/>
+              <a:t>A variety of input parameters were considered (e.g. chirp, CEP,…)</a:t>
+            </a:r>
+          </a:p>
+        </p:txBody>
+      </p:sp>
+      <p:sp>
+        <p:nvSpPr>
+          <p:cNvPr id="8" name="TextBox 7">
+            <a:extLst>
+              <a:ext uri="{FF2B5EF4-FFF2-40B4-BE49-F238E27FC236}">
+                <a16:creationId xmlns:a16="http://schemas.microsoft.com/office/drawing/2014/main" id="{F6E3CB02-0BD4-132C-A1D2-B0D6704613C9}"/>
+              </a:ext>
+            </a:extLst>
+          </p:cNvPr>
+          <p:cNvSpPr txBox="1"/>
+          <p:nvPr/>
+        </p:nvSpPr>
+        <p:spPr>
+          <a:xfrm>
+            <a:off x="7274697" y="5448060"/>
+            <a:ext cx="4249881" cy="369332"/>
+          </a:xfrm>
+          <a:prstGeom prst="rect">
+            <a:avLst/>
+          </a:prstGeom>
+          <a:noFill/>
+        </p:spPr>
+        <p:txBody>
+          <a:bodyPr wrap="none" rtlCol="0">
+            <a:spAutoFit/>
+          </a:bodyPr>
+          <a:lstStyle/>
+          <a:p>
+            <a:r>
+              <a:rPr lang="en-GB" i="1" dirty="0"/>
+              <a:t>Fig. X</a:t>
+            </a:r>
+            <a:r>
+              <a:rPr lang="en-GB" dirty="0"/>
+              <a:t>: IR input pulse in the time domain</a:t>
+            </a:r>
           </a:p>
         </p:txBody>
       </p:sp>
@@ -10179,15 +11916,146 @@
           <a:chExt cx="0" cy="0"/>
         </a:xfrm>
       </p:grpSpPr>
-      <p:sp>
-        <p:nvSpPr>
-          <p:cNvPr id="2" name="Title 1">
+      <p:pic>
+        <p:nvPicPr>
+          <p:cNvPr id="9" name="Picture 8" descr="A graph of a graph with red and blue dots&#10;&#10;Description automatically generated">
             <a:extLst>
               <a:ext uri="{FF2B5EF4-FFF2-40B4-BE49-F238E27FC236}">
-                <a16:creationId xmlns:a16="http://schemas.microsoft.com/office/drawing/2014/main" id="{B5DA8603-104C-93BF-B64B-70EBE5785F36}"/>
+                <a16:creationId xmlns:a16="http://schemas.microsoft.com/office/drawing/2014/main" id="{25C5ABC1-341E-7B76-1C39-5675BCFF2173}"/>
               </a:ext>
             </a:extLst>
           </p:cNvPr>
+          <p:cNvPicPr>
+            <a:picLocks noChangeAspect="1"/>
+          </p:cNvPicPr>
+          <p:nvPr/>
+        </p:nvPicPr>
+        <p:blipFill>
+          <a:blip r:embed="rId2" cstate="print">
+            <a:extLst>
+              <a:ext uri="{28A0092B-C50C-407E-A947-70E740481C1C}">
+                <a14:useLocalDpi xmlns:a14="http://schemas.microsoft.com/office/drawing/2010/main" val="0"/>
+              </a:ext>
+            </a:extLst>
+          </a:blip>
+          <a:stretch>
+            <a:fillRect/>
+          </a:stretch>
+        </p:blipFill>
+        <p:spPr>
+          <a:xfrm>
+            <a:off x="6023703" y="1406520"/>
+            <a:ext cx="5759817" cy="4319634"/>
+          </a:xfrm>
+          <a:prstGeom prst="rect">
+            <a:avLst/>
+          </a:prstGeom>
+        </p:spPr>
+      </p:pic>
+      <p:pic>
+        <p:nvPicPr>
+          <p:cNvPr id="11" name="Picture 10" descr="A graph of a graph of a number of objects&#10;&#10;Description automatically generated with medium confidence">
+            <a:extLst>
+              <a:ext uri="{FF2B5EF4-FFF2-40B4-BE49-F238E27FC236}">
+                <a16:creationId xmlns:a16="http://schemas.microsoft.com/office/drawing/2014/main" id="{0C22D06D-09B3-CBA1-DBA9-71A633EF4671}"/>
+              </a:ext>
+            </a:extLst>
+          </p:cNvPr>
+          <p:cNvPicPr>
+            <a:picLocks noChangeAspect="1"/>
+          </p:cNvPicPr>
+          <p:nvPr/>
+        </p:nvPicPr>
+        <p:blipFill>
+          <a:blip r:embed="rId3" cstate="print">
+            <a:extLst>
+              <a:ext uri="{28A0092B-C50C-407E-A947-70E740481C1C}">
+                <a14:useLocalDpi xmlns:a14="http://schemas.microsoft.com/office/drawing/2010/main" val="0"/>
+              </a:ext>
+            </a:extLst>
+          </a:blip>
+          <a:stretch>
+            <a:fillRect/>
+          </a:stretch>
+        </p:blipFill>
+        <p:spPr>
+          <a:xfrm>
+            <a:off x="6123" y="1406520"/>
+            <a:ext cx="5759817" cy="4319634"/>
+          </a:xfrm>
+          <a:prstGeom prst="rect">
+            <a:avLst/>
+          </a:prstGeom>
+        </p:spPr>
+      </p:pic>
+      <p:sp>
+        <p:nvSpPr>
+          <p:cNvPr id="3" name="Content Placeholder 2">
+            <a:extLst>
+              <a:ext uri="{FF2B5EF4-FFF2-40B4-BE49-F238E27FC236}">
+                <a16:creationId xmlns:a16="http://schemas.microsoft.com/office/drawing/2014/main" id="{85F51EC1-3890-536A-A703-B1429044E96F}"/>
+              </a:ext>
+            </a:extLst>
+          </p:cNvPr>
+          <p:cNvSpPr>
+            <a:spLocks noGrp="1"/>
+          </p:cNvSpPr>
+          <p:nvPr>
+            <p:ph/>
+          </p:nvPr>
+        </p:nvSpPr>
+        <p:spPr/>
+        <p:txBody>
+          <a:bodyPr/>
+          <a:lstStyle/>
+          <a:p>
+            <a:pPr marL="0" indent="0">
+              <a:buNone/>
+            </a:pPr>
+            <a:r>
+              <a:rPr lang="en-GB" dirty="0"/>
+              <a:t>The simulated UV spectra and energies agree well with experiment:</a:t>
+            </a:r>
+          </a:p>
+        </p:txBody>
+      </p:sp>
+      <p:sp>
+        <p:nvSpPr>
+          <p:cNvPr id="4" name="Footer Placeholder 3">
+            <a:extLst>
+              <a:ext uri="{FF2B5EF4-FFF2-40B4-BE49-F238E27FC236}">
+                <a16:creationId xmlns:a16="http://schemas.microsoft.com/office/drawing/2014/main" id="{01412D62-309E-D747-3390-3DD390D6B23A}"/>
+              </a:ext>
+            </a:extLst>
+          </p:cNvPr>
+          <p:cNvSpPr>
+            <a:spLocks noGrp="1"/>
+          </p:cNvSpPr>
+          <p:nvPr>
+            <p:ph type="ftr" idx="1"/>
+          </p:nvPr>
+        </p:nvSpPr>
+        <p:spPr/>
+        <p:txBody>
+          <a:bodyPr/>
+          <a:lstStyle/>
+          <a:p>
+            <a:r>
+              <a:rPr lang="en-GB"/>
+              <a:t>| Project Presentation | David Amorim, 04.09.2023 </a:t>
+            </a:r>
+          </a:p>
+        </p:txBody>
+      </p:sp>
+      <p:sp>
+        <p:nvSpPr>
+          <p:cNvPr id="7" name="Title 4">
+            <a:extLst>
+              <a:ext uri="{FF2B5EF4-FFF2-40B4-BE49-F238E27FC236}">
+                <a16:creationId xmlns:a16="http://schemas.microsoft.com/office/drawing/2014/main" id="{BA766CF2-4A19-4C02-8121-1A05C001356E}"/>
+              </a:ext>
+            </a:extLst>
+          </p:cNvPr>
           <p:cNvSpPr>
             <a:spLocks noGrp="1"/>
           </p:cNvSpPr>
@@ -10195,30 +12063,644 @@
             <p:ph type="title"/>
           </p:nvPr>
         </p:nvSpPr>
-        <p:spPr/>
+        <p:spPr>
+          <a:xfrm>
+            <a:off x="407520" y="313920"/>
+            <a:ext cx="9968400" cy="450720"/>
+          </a:xfrm>
+        </p:spPr>
         <p:txBody>
           <a:bodyPr/>
           <a:lstStyle/>
           <a:p>
             <a:r>
-              <a:rPr lang="en-US" sz="4400" b="1" strike="noStrike" spc="-1" dirty="0">
+              <a:rPr lang="en-US" b="1" strike="noStrike" spc="-1" dirty="0">
                 <a:solidFill>
                   <a:srgbClr val="009FDF"/>
                 </a:solidFill>
                 <a:latin typeface="Arial"/>
               </a:rPr>
-              <a:t>References</a:t>
+              <a:t>4.I </a:t>
+            </a:r>
+            <a:r>
+              <a:rPr lang="en-US" b="1" spc="-1" dirty="0">
+                <a:solidFill>
+                  <a:srgbClr val="009FDF"/>
+                </a:solidFill>
+                <a:latin typeface="Arial"/>
+              </a:rPr>
+              <a:t>Comparison with experiment</a:t>
+            </a:r>
+            <a:r>
+              <a:rPr lang="en-US" b="1" strike="noStrike" spc="-1" dirty="0">
+                <a:solidFill>
+                  <a:srgbClr val="009FDF"/>
+                </a:solidFill>
+                <a:latin typeface="Arial"/>
+              </a:rPr>
+              <a:t> </a:t>
             </a:r>
             <a:endParaRPr lang="en-GB" dirty="0"/>
           </a:p>
         </p:txBody>
       </p:sp>
+      <p:sp>
+        <p:nvSpPr>
+          <p:cNvPr id="12" name="TextBox 11">
+            <a:extLst>
+              <a:ext uri="{FF2B5EF4-FFF2-40B4-BE49-F238E27FC236}">
+                <a16:creationId xmlns:a16="http://schemas.microsoft.com/office/drawing/2014/main" id="{AE152220-DB8C-0A01-649D-F93CAD0CECA9}"/>
+              </a:ext>
+            </a:extLst>
+          </p:cNvPr>
+          <p:cNvSpPr txBox="1"/>
+          <p:nvPr/>
+        </p:nvSpPr>
+        <p:spPr>
+          <a:xfrm>
+            <a:off x="407880" y="5777465"/>
+            <a:ext cx="5096332" cy="646331"/>
+          </a:xfrm>
+          <a:prstGeom prst="rect">
+            <a:avLst/>
+          </a:prstGeom>
+          <a:noFill/>
+        </p:spPr>
+        <p:txBody>
+          <a:bodyPr wrap="none" rtlCol="0">
+            <a:spAutoFit/>
+          </a:bodyPr>
+          <a:lstStyle/>
+          <a:p>
+            <a:r>
+              <a:rPr lang="en-GB" i="1" dirty="0"/>
+              <a:t>Fig. X</a:t>
+            </a:r>
+            <a:r>
+              <a:rPr lang="en-GB" dirty="0"/>
+              <a:t>: UV output spectra for Argon with 150mW</a:t>
+            </a:r>
+          </a:p>
+          <a:p>
+            <a:r>
+              <a:rPr lang="en-GB" dirty="0"/>
+              <a:t>input beam power and 0.4bar central pressure</a:t>
+            </a:r>
+          </a:p>
+        </p:txBody>
+      </p:sp>
+      <p:sp>
+        <p:nvSpPr>
+          <p:cNvPr id="13" name="TextBox 12">
+            <a:extLst>
+              <a:ext uri="{FF2B5EF4-FFF2-40B4-BE49-F238E27FC236}">
+                <a16:creationId xmlns:a16="http://schemas.microsoft.com/office/drawing/2014/main" id="{03CD38C2-F94B-3682-FD9D-04484783ECC4}"/>
+              </a:ext>
+            </a:extLst>
+          </p:cNvPr>
+          <p:cNvSpPr txBox="1"/>
+          <p:nvPr/>
+        </p:nvSpPr>
+        <p:spPr>
+          <a:xfrm>
+            <a:off x="6355445" y="5758952"/>
+            <a:ext cx="5224572" cy="646331"/>
+          </a:xfrm>
+          <a:prstGeom prst="rect">
+            <a:avLst/>
+          </a:prstGeom>
+          <a:noFill/>
+        </p:spPr>
+        <p:txBody>
+          <a:bodyPr wrap="none" rtlCol="0">
+            <a:spAutoFit/>
+          </a:bodyPr>
+          <a:lstStyle/>
+          <a:p>
+            <a:r>
+              <a:rPr lang="en-GB" i="1" dirty="0"/>
+              <a:t>Fig. X</a:t>
+            </a:r>
+            <a:r>
+              <a:rPr lang="en-GB" dirty="0"/>
+              <a:t>: UV output energies for Argon with 150mW</a:t>
+            </a:r>
+          </a:p>
+          <a:p>
+            <a:r>
+              <a:rPr lang="en-GB" dirty="0"/>
+              <a:t>input beam power</a:t>
+            </a:r>
+          </a:p>
+        </p:txBody>
+      </p:sp>
+    </p:spTree>
+    <p:extLst>
+      <p:ext uri="{BB962C8B-B14F-4D97-AF65-F5344CB8AC3E}">
+        <p14:creationId xmlns:p14="http://schemas.microsoft.com/office/powerpoint/2010/main" val="3663974304"/>
+      </p:ext>
+    </p:extLst>
+  </p:cSld>
+  <p:clrMapOvr>
+    <a:masterClrMapping/>
+  </p:clrMapOvr>
+</p:sld>
+</file>
+
+<file path=ppt/slides/slide8.xml><?xml version="1.0" encoding="utf-8"?>
+<p:sld xmlns:a="http://schemas.openxmlformats.org/drawingml/2006/main" xmlns:r="http://schemas.openxmlformats.org/officeDocument/2006/relationships" xmlns:p="http://schemas.openxmlformats.org/presentationml/2006/main">
+  <p:cSld>
+    <p:spTree>
+      <p:nvGrpSpPr>
+        <p:cNvPr id="1" name=""/>
+        <p:cNvGrpSpPr/>
+        <p:nvPr/>
+      </p:nvGrpSpPr>
+      <p:grpSpPr>
+        <a:xfrm>
+          <a:off x="0" y="0"/>
+          <a:ext cx="0" cy="0"/>
+          <a:chOff x="0" y="0"/>
+          <a:chExt cx="0" cy="0"/>
+        </a:xfrm>
+      </p:grpSpPr>
+      <p:pic>
+        <p:nvPicPr>
+          <p:cNvPr id="12" name="Picture 11" descr="A chart of a graph&#10;&#10;Description automatically generated with medium confidence">
+            <a:extLst>
+              <a:ext uri="{FF2B5EF4-FFF2-40B4-BE49-F238E27FC236}">
+                <a16:creationId xmlns:a16="http://schemas.microsoft.com/office/drawing/2014/main" id="{F9DF5876-3C5E-E4AB-0B29-FBA09CF9244F}"/>
+              </a:ext>
+            </a:extLst>
+          </p:cNvPr>
+          <p:cNvPicPr>
+            <a:picLocks noChangeAspect="1"/>
+          </p:cNvPicPr>
+          <p:nvPr/>
+        </p:nvPicPr>
+        <p:blipFill>
+          <a:blip r:embed="rId2" cstate="print">
+            <a:extLst>
+              <a:ext uri="{28A0092B-C50C-407E-A947-70E740481C1C}">
+                <a14:useLocalDpi xmlns:a14="http://schemas.microsoft.com/office/drawing/2010/main" val="0"/>
+              </a:ext>
+            </a:extLst>
+          </a:blip>
+          <a:stretch>
+            <a:fillRect/>
+          </a:stretch>
+        </p:blipFill>
+        <p:spPr>
+          <a:xfrm>
+            <a:off x="6479458" y="2886120"/>
+            <a:ext cx="3840203" cy="2880000"/>
+          </a:xfrm>
+          <a:prstGeom prst="rect">
+            <a:avLst/>
+          </a:prstGeom>
+        </p:spPr>
+      </p:pic>
+      <p:pic>
+        <p:nvPicPr>
+          <p:cNvPr id="10" name="Content Placeholder 9" descr="A close-up of a graph&#10;&#10;Description automatically generated">
+            <a:extLst>
+              <a:ext uri="{FF2B5EF4-FFF2-40B4-BE49-F238E27FC236}">
+                <a16:creationId xmlns:a16="http://schemas.microsoft.com/office/drawing/2014/main" id="{35AA926D-A6BB-5B77-691C-F72C21EE67C8}"/>
+              </a:ext>
+            </a:extLst>
+          </p:cNvPr>
+          <p:cNvPicPr>
+            <a:picLocks noGrp="1" noChangeAspect="1"/>
+          </p:cNvPicPr>
+          <p:nvPr>
+            <p:ph/>
+          </p:nvPr>
+        </p:nvPicPr>
+        <p:blipFill>
+          <a:blip r:embed="rId3" cstate="print">
+            <a:extLst>
+              <a:ext uri="{28A0092B-C50C-407E-A947-70E740481C1C}">
+                <a14:useLocalDpi xmlns:a14="http://schemas.microsoft.com/office/drawing/2010/main" val="0"/>
+              </a:ext>
+            </a:extLst>
+          </a:blip>
+          <a:stretch>
+            <a:fillRect/>
+          </a:stretch>
+        </p:blipFill>
+        <p:spPr>
+          <a:xfrm>
+            <a:off x="6382929" y="90720"/>
+            <a:ext cx="3840203" cy="2880000"/>
+          </a:xfrm>
+        </p:spPr>
+      </p:pic>
+      <p:sp>
+        <p:nvSpPr>
+          <p:cNvPr id="4" name="Footer Placeholder 3">
+            <a:extLst>
+              <a:ext uri="{FF2B5EF4-FFF2-40B4-BE49-F238E27FC236}">
+                <a16:creationId xmlns:a16="http://schemas.microsoft.com/office/drawing/2014/main" id="{985FE8B4-2512-448C-4DE7-1B85564A5CA4}"/>
+              </a:ext>
+            </a:extLst>
+          </p:cNvPr>
+          <p:cNvSpPr>
+            <a:spLocks noGrp="1"/>
+          </p:cNvSpPr>
+          <p:nvPr>
+            <p:ph type="ftr" idx="1"/>
+          </p:nvPr>
+        </p:nvSpPr>
+        <p:spPr/>
+        <p:txBody>
+          <a:bodyPr/>
+          <a:lstStyle/>
+          <a:p>
+            <a:r>
+              <a:rPr lang="en-GB"/>
+              <a:t>| Project Presentation | David Amorim, 04.09.2023 </a:t>
+            </a:r>
+          </a:p>
+        </p:txBody>
+      </p:sp>
+      <p:sp>
+        <p:nvSpPr>
+          <p:cNvPr id="7" name="Title 4">
+            <a:extLst>
+              <a:ext uri="{FF2B5EF4-FFF2-40B4-BE49-F238E27FC236}">
+                <a16:creationId xmlns:a16="http://schemas.microsoft.com/office/drawing/2014/main" id="{975E696E-7F7C-8257-901B-3F3337EC4DD1}"/>
+              </a:ext>
+            </a:extLst>
+          </p:cNvPr>
+          <p:cNvSpPr>
+            <a:spLocks noGrp="1"/>
+          </p:cNvSpPr>
+          <p:nvPr>
+            <p:ph type="title"/>
+          </p:nvPr>
+        </p:nvSpPr>
+        <p:spPr>
+          <a:xfrm>
+            <a:off x="407520" y="539280"/>
+            <a:ext cx="6809357" cy="450720"/>
+          </a:xfrm>
+        </p:spPr>
+        <p:txBody>
+          <a:bodyPr/>
+          <a:lstStyle/>
+          <a:p>
+            <a:r>
+              <a:rPr lang="en-US" b="1" strike="noStrike" spc="-1" dirty="0">
+                <a:solidFill>
+                  <a:srgbClr val="009FDF"/>
+                </a:solidFill>
+                <a:latin typeface="Arial"/>
+              </a:rPr>
+              <a:t>4.I </a:t>
+            </a:r>
+            <a:r>
+              <a:rPr lang="en-US" b="1" spc="-1" dirty="0">
+                <a:solidFill>
+                  <a:srgbClr val="009FDF"/>
+                </a:solidFill>
+                <a:latin typeface="Arial"/>
+              </a:rPr>
+              <a:t>Comparison with experiment</a:t>
+            </a:r>
+            <a:r>
+              <a:rPr lang="en-US" b="1" strike="noStrike" spc="-1" dirty="0">
+                <a:solidFill>
+                  <a:srgbClr val="009FDF"/>
+                </a:solidFill>
+                <a:latin typeface="Arial"/>
+              </a:rPr>
+              <a:t> </a:t>
+            </a:r>
+            <a:endParaRPr lang="en-GB" dirty="0"/>
+          </a:p>
+        </p:txBody>
+      </p:sp>
+      <p:sp>
+        <p:nvSpPr>
+          <p:cNvPr id="8" name="TextBox 7">
+            <a:extLst>
+              <a:ext uri="{FF2B5EF4-FFF2-40B4-BE49-F238E27FC236}">
+                <a16:creationId xmlns:a16="http://schemas.microsoft.com/office/drawing/2014/main" id="{07942291-F1DC-1E98-63F2-EF638A67DC8B}"/>
+              </a:ext>
+            </a:extLst>
+          </p:cNvPr>
+          <p:cNvSpPr txBox="1"/>
+          <p:nvPr/>
+        </p:nvSpPr>
+        <p:spPr>
+          <a:xfrm>
+            <a:off x="6479458" y="5769949"/>
+            <a:ext cx="5742289" cy="646331"/>
+          </a:xfrm>
+          <a:prstGeom prst="rect">
+            <a:avLst/>
+          </a:prstGeom>
+          <a:noFill/>
+        </p:spPr>
+        <p:txBody>
+          <a:bodyPr wrap="square" rtlCol="0">
+            <a:spAutoFit/>
+          </a:bodyPr>
+          <a:lstStyle/>
+          <a:p>
+            <a:r>
+              <a:rPr lang="en-GB" i="1" dirty="0"/>
+              <a:t>Fig. X</a:t>
+            </a:r>
+            <a:r>
+              <a:rPr lang="en-GB" dirty="0"/>
+              <a:t>: UV output spectral pressure scan map (Argon, 150mW)</a:t>
+            </a:r>
+          </a:p>
+        </p:txBody>
+      </p:sp>
+      <p:sp>
+        <p:nvSpPr>
+          <p:cNvPr id="13" name="TextBox 12">
+            <a:extLst>
+              <a:ext uri="{FF2B5EF4-FFF2-40B4-BE49-F238E27FC236}">
+                <a16:creationId xmlns:a16="http://schemas.microsoft.com/office/drawing/2014/main" id="{F029DA5F-B347-E599-0ABA-E47D23055D05}"/>
+              </a:ext>
+            </a:extLst>
+          </p:cNvPr>
+          <p:cNvSpPr txBox="1"/>
+          <p:nvPr/>
+        </p:nvSpPr>
+        <p:spPr>
+          <a:xfrm>
+            <a:off x="10176387" y="1779077"/>
+            <a:ext cx="1524000" cy="369332"/>
+          </a:xfrm>
+          <a:prstGeom prst="rect">
+            <a:avLst/>
+          </a:prstGeom>
+          <a:noFill/>
+        </p:spPr>
+        <p:txBody>
+          <a:bodyPr wrap="square" rtlCol="0">
+            <a:spAutoFit/>
+          </a:bodyPr>
+          <a:lstStyle/>
+          <a:p>
+            <a:r>
+              <a:rPr lang="en-GB" i="1" dirty="0"/>
+              <a:t>(a) </a:t>
+            </a:r>
+            <a:r>
+              <a:rPr lang="en-GB" dirty="0"/>
+              <a:t>simulated</a:t>
+            </a:r>
+          </a:p>
+        </p:txBody>
+      </p:sp>
+      <p:sp>
+        <p:nvSpPr>
+          <p:cNvPr id="14" name="TextBox 13">
+            <a:extLst>
+              <a:ext uri="{FF2B5EF4-FFF2-40B4-BE49-F238E27FC236}">
+                <a16:creationId xmlns:a16="http://schemas.microsoft.com/office/drawing/2014/main" id="{A66CC00B-1CD4-C8E2-046C-A38E8F9BBBA9}"/>
+              </a:ext>
+            </a:extLst>
+          </p:cNvPr>
+          <p:cNvSpPr txBox="1"/>
+          <p:nvPr/>
+        </p:nvSpPr>
+        <p:spPr>
+          <a:xfrm>
+            <a:off x="10176386" y="4304349"/>
+            <a:ext cx="1764031" cy="369332"/>
+          </a:xfrm>
+          <a:prstGeom prst="rect">
+            <a:avLst/>
+          </a:prstGeom>
+          <a:noFill/>
+        </p:spPr>
+        <p:txBody>
+          <a:bodyPr wrap="square" rtlCol="0">
+            <a:spAutoFit/>
+          </a:bodyPr>
+          <a:lstStyle/>
+          <a:p>
+            <a:r>
+              <a:rPr lang="en-GB" i="1" dirty="0"/>
+              <a:t>(b) </a:t>
+            </a:r>
+            <a:r>
+              <a:rPr lang="en-GB" dirty="0"/>
+              <a:t>measured</a:t>
+            </a:r>
+          </a:p>
+        </p:txBody>
+      </p:sp>
+      <p:sp>
+        <p:nvSpPr>
+          <p:cNvPr id="17" name="Content Placeholder 2">
+            <a:extLst>
+              <a:ext uri="{FF2B5EF4-FFF2-40B4-BE49-F238E27FC236}">
+                <a16:creationId xmlns:a16="http://schemas.microsoft.com/office/drawing/2014/main" id="{1C7C1E6B-8648-84E7-70B0-59D127FDDA92}"/>
+              </a:ext>
+            </a:extLst>
+          </p:cNvPr>
+          <p:cNvSpPr txBox="1">
+            <a:spLocks/>
+          </p:cNvSpPr>
+          <p:nvPr/>
+        </p:nvSpPr>
+        <p:spPr>
+          <a:xfrm>
+            <a:off x="407881" y="1406520"/>
+            <a:ext cx="5688120" cy="5009760"/>
+          </a:xfrm>
+          <a:prstGeom prst="rect">
+            <a:avLst/>
+          </a:prstGeom>
+          <a:noFill/>
+          <a:ln w="0">
+            <a:noFill/>
+          </a:ln>
+        </p:spPr>
+        <p:txBody>
+          <a:bodyPr lIns="0" tIns="0" rIns="0" bIns="0" anchor="ctr">
+            <a:noAutofit/>
+          </a:bodyPr>
+          <a:lstStyle>
+            <a:lvl1pPr algn="l" defTabSz="914400" rtl="0" eaLnBrk="1" latinLnBrk="0" hangingPunct="1">
+              <a:lnSpc>
+                <a:spcPct val="90000"/>
+              </a:lnSpc>
+              <a:spcBef>
+                <a:spcPct val="0"/>
+              </a:spcBef>
+              <a:buNone/>
+              <a:defRPr sz="4400" kern="1200">
+                <a:solidFill>
+                  <a:schemeClr val="tx1"/>
+                </a:solidFill>
+                <a:latin typeface="+mj-lt"/>
+                <a:ea typeface="+mj-ea"/>
+                <a:cs typeface="+mj-cs"/>
+              </a:defRPr>
+            </a:lvl1pPr>
+          </a:lstStyle>
+          <a:p>
+            <a:pPr marL="457200" indent="-457200">
+              <a:buFont typeface="Arial" panose="020B0604020202020204" pitchFamily="34" charset="0"/>
+              <a:buChar char="•"/>
+            </a:pPr>
+            <a:r>
+              <a:rPr lang="en-GB" sz="2600" dirty="0"/>
+              <a:t>Waffle </a:t>
+            </a:r>
+          </a:p>
+          <a:p>
+            <a:pPr marL="457200" indent="-457200">
+              <a:buFont typeface="Arial" panose="020B0604020202020204" pitchFamily="34" charset="0"/>
+              <a:buChar char="•"/>
+            </a:pPr>
+            <a:endParaRPr lang="en-GB" sz="2600" dirty="0"/>
+          </a:p>
+          <a:p>
+            <a:pPr marL="457200" indent="-457200">
+              <a:buFont typeface="Arial" panose="020B0604020202020204" pitchFamily="34" charset="0"/>
+              <a:buChar char="•"/>
+            </a:pPr>
+            <a:endParaRPr lang="en-GB" sz="2600" dirty="0"/>
+          </a:p>
+          <a:p>
+            <a:pPr marL="457200" indent="-457200">
+              <a:buFont typeface="Arial" panose="020B0604020202020204" pitchFamily="34" charset="0"/>
+              <a:buChar char="•"/>
+            </a:pPr>
+            <a:endParaRPr lang="en-GB" sz="2600" dirty="0"/>
+          </a:p>
+          <a:p>
+            <a:pPr marL="457200" indent="-457200">
+              <a:buFont typeface="Arial" panose="020B0604020202020204" pitchFamily="34" charset="0"/>
+              <a:buChar char="•"/>
+            </a:pPr>
+            <a:endParaRPr lang="en-GB" sz="2600" dirty="0"/>
+          </a:p>
+          <a:p>
+            <a:pPr marL="457200" indent="-457200">
+              <a:buFont typeface="Arial" panose="020B0604020202020204" pitchFamily="34" charset="0"/>
+              <a:buChar char="•"/>
+            </a:pPr>
+            <a:endParaRPr lang="en-GB" sz="2600" dirty="0"/>
+          </a:p>
+          <a:p>
+            <a:pPr marL="457200" indent="-457200">
+              <a:buFont typeface="Arial" panose="020B0604020202020204" pitchFamily="34" charset="0"/>
+              <a:buChar char="•"/>
+            </a:pPr>
+            <a:endParaRPr lang="en-GB" sz="2600" dirty="0"/>
+          </a:p>
+          <a:p>
+            <a:pPr marL="457200" indent="-457200">
+              <a:buFont typeface="Arial" panose="020B0604020202020204" pitchFamily="34" charset="0"/>
+              <a:buChar char="•"/>
+            </a:pPr>
+            <a:endParaRPr lang="en-GB" sz="2600" dirty="0"/>
+          </a:p>
+          <a:p>
+            <a:pPr marL="457200" indent="-457200">
+              <a:buFont typeface="Arial" panose="020B0604020202020204" pitchFamily="34" charset="0"/>
+              <a:buChar char="•"/>
+            </a:pPr>
+            <a:endParaRPr lang="en-GB" sz="2600" dirty="0"/>
+          </a:p>
+          <a:p>
+            <a:pPr marL="457200" indent="-457200">
+              <a:buFont typeface="Arial" panose="020B0604020202020204" pitchFamily="34" charset="0"/>
+              <a:buChar char="•"/>
+            </a:pPr>
+            <a:endParaRPr lang="en-GB" sz="2600" dirty="0"/>
+          </a:p>
+          <a:p>
+            <a:pPr marL="457200" indent="-457200">
+              <a:buFont typeface="Arial" panose="020B0604020202020204" pitchFamily="34" charset="0"/>
+              <a:buChar char="•"/>
+            </a:pPr>
+            <a:endParaRPr lang="en-GB" sz="2600" dirty="0"/>
+          </a:p>
+        </p:txBody>
+      </p:sp>
+    </p:spTree>
+    <p:extLst>
+      <p:ext uri="{BB962C8B-B14F-4D97-AF65-F5344CB8AC3E}">
+        <p14:creationId xmlns:p14="http://schemas.microsoft.com/office/powerpoint/2010/main" val="2854774834"/>
+      </p:ext>
+    </p:extLst>
+  </p:cSld>
+  <p:clrMapOvr>
+    <a:masterClrMapping/>
+  </p:clrMapOvr>
+</p:sld>
+</file>
+
+<file path=ppt/slides/slide9.xml><?xml version="1.0" encoding="utf-8"?>
+<p:sld xmlns:a="http://schemas.openxmlformats.org/drawingml/2006/main" xmlns:r="http://schemas.openxmlformats.org/officeDocument/2006/relationships" xmlns:p="http://schemas.openxmlformats.org/presentationml/2006/main">
+  <p:cSld>
+    <p:spTree>
+      <p:nvGrpSpPr>
+        <p:cNvPr id="1" name=""/>
+        <p:cNvGrpSpPr/>
+        <p:nvPr/>
+      </p:nvGrpSpPr>
+      <p:grpSpPr>
+        <a:xfrm>
+          <a:off x="0" y="0"/>
+          <a:ext cx="0" cy="0"/>
+          <a:chOff x="0" y="0"/>
+          <a:chExt cx="0" cy="0"/>
+        </a:xfrm>
+      </p:grpSpPr>
+      <p:pic>
+        <p:nvPicPr>
+          <p:cNvPr id="11" name="Picture 10" descr="A rainbow colored circle with numbers&#10;&#10;Description automatically generated with medium confidence">
+            <a:extLst>
+              <a:ext uri="{FF2B5EF4-FFF2-40B4-BE49-F238E27FC236}">
+                <a16:creationId xmlns:a16="http://schemas.microsoft.com/office/drawing/2014/main" id="{FAD759D0-3B4B-40F1-5A48-22F473B3DADF}"/>
+              </a:ext>
+            </a:extLst>
+          </p:cNvPr>
+          <p:cNvPicPr>
+            <a:picLocks noChangeAspect="1"/>
+          </p:cNvPicPr>
+          <p:nvPr/>
+        </p:nvPicPr>
+        <p:blipFill>
+          <a:blip r:embed="rId2" cstate="print">
+            <a:extLst>
+              <a:ext uri="{28A0092B-C50C-407E-A947-70E740481C1C}">
+                <a14:useLocalDpi xmlns:a14="http://schemas.microsoft.com/office/drawing/2010/main" val="0"/>
+              </a:ext>
+            </a:extLst>
+          </a:blip>
+          <a:stretch>
+            <a:fillRect/>
+          </a:stretch>
+        </p:blipFill>
+        <p:spPr>
+          <a:xfrm>
+            <a:off x="5993872" y="3045241"/>
+            <a:ext cx="3840203" cy="2880000"/>
+          </a:xfrm>
+          <a:prstGeom prst="rect">
+            <a:avLst/>
+          </a:prstGeom>
+        </p:spPr>
+      </p:pic>
       <p:sp>
         <p:nvSpPr>
           <p:cNvPr id="3" name="Content Placeholder 2">
             <a:extLst>
               <a:ext uri="{FF2B5EF4-FFF2-40B4-BE49-F238E27FC236}">
-                <a16:creationId xmlns:a16="http://schemas.microsoft.com/office/drawing/2014/main" id="{0CF2CD06-D9EC-AA51-309B-9F7B11A3AE9B}"/>
+                <a16:creationId xmlns:a16="http://schemas.microsoft.com/office/drawing/2014/main" id="{33FB69D3-6012-C86D-8946-FDC07721969E}"/>
               </a:ext>
             </a:extLst>
           </p:cNvPr>
@@ -10229,26 +12711,37 @@
             <p:ph/>
           </p:nvPr>
         </p:nvSpPr>
-        <p:spPr/>
+        <p:spPr>
+          <a:xfrm>
+            <a:off x="407880" y="1406520"/>
+            <a:ext cx="4939925" cy="5009760"/>
+          </a:xfrm>
+        </p:spPr>
         <p:txBody>
           <a:bodyPr/>
           <a:lstStyle/>
           <a:p>
-            <a:pPr marL="0" indent="0">
-              <a:buNone/>
-            </a:pPr>
             <a:r>
               <a:rPr lang="en-GB" dirty="0"/>
-              <a:t>[1] Luna</a:t>
-            </a:r>
-          </a:p>
-          <a:p>
-            <a:pPr marL="0" indent="0">
-              <a:buNone/>
-            </a:pPr>
+              <a:t>The simulations could demonstrate leading-edge self-steepening of the UV pulses </a:t>
+            </a:r>
+          </a:p>
+          <a:p>
             <a:r>
               <a:rPr lang="en-GB" dirty="0"/>
-              <a:t>[2] Deriving UPPE from Maxwell’s Equations</a:t>
+              <a:t>This adds to spectral broadening and pulse compression </a:t>
+            </a:r>
+          </a:p>
+          <a:p>
+            <a:r>
+              <a:rPr lang="en-GB" dirty="0"/>
+              <a:t>Self-steepening seems to be caused by ionisation </a:t>
+            </a:r>
+          </a:p>
+          <a:p>
+            <a:r>
+              <a:rPr lang="en-GB" dirty="0"/>
+              <a:t>These results agree with the literature [3]</a:t>
             </a:r>
           </a:p>
         </p:txBody>
@@ -10258,7 +12751,7 @@
           <p:cNvPr id="4" name="Footer Placeholder 3">
             <a:extLst>
               <a:ext uri="{FF2B5EF4-FFF2-40B4-BE49-F238E27FC236}">
-                <a16:creationId xmlns:a16="http://schemas.microsoft.com/office/drawing/2014/main" id="{A6B15F38-5E1E-8FDC-71E3-7E43E9128217}"/>
+                <a16:creationId xmlns:a16="http://schemas.microsoft.com/office/drawing/2014/main" id="{662CA4AF-86D9-0387-C441-F2A6574C9AB6}"/>
               </a:ext>
             </a:extLst>
           </p:cNvPr>
@@ -10281,10 +12774,202 @@
           </a:p>
         </p:txBody>
       </p:sp>
+      <p:sp>
+        <p:nvSpPr>
+          <p:cNvPr id="7" name="Title 4">
+            <a:extLst>
+              <a:ext uri="{FF2B5EF4-FFF2-40B4-BE49-F238E27FC236}">
+                <a16:creationId xmlns:a16="http://schemas.microsoft.com/office/drawing/2014/main" id="{204CFC13-EA81-DD65-75E9-4498D5231745}"/>
+              </a:ext>
+            </a:extLst>
+          </p:cNvPr>
+          <p:cNvSpPr>
+            <a:spLocks noGrp="1"/>
+          </p:cNvSpPr>
+          <p:nvPr>
+            <p:ph type="title"/>
+          </p:nvPr>
+        </p:nvSpPr>
+        <p:spPr>
+          <a:xfrm>
+            <a:off x="407520" y="313920"/>
+            <a:ext cx="9968400" cy="450720"/>
+          </a:xfrm>
+        </p:spPr>
+        <p:txBody>
+          <a:bodyPr/>
+          <a:lstStyle/>
+          <a:p>
+            <a:r>
+              <a:rPr lang="en-US" b="1" spc="-1" dirty="0">
+                <a:solidFill>
+                  <a:srgbClr val="009FDF"/>
+                </a:solidFill>
+                <a:latin typeface="Arial"/>
+              </a:rPr>
+              <a:t>4.II Self-steepening</a:t>
+            </a:r>
+            <a:endParaRPr lang="en-GB" dirty="0"/>
+          </a:p>
+        </p:txBody>
+      </p:sp>
+      <p:pic>
+        <p:nvPicPr>
+          <p:cNvPr id="9" name="Picture 8" descr="A rainbow colored circle with numbers and a chart&#10;&#10;Description automatically generated with medium confidence">
+            <a:extLst>
+              <a:ext uri="{FF2B5EF4-FFF2-40B4-BE49-F238E27FC236}">
+                <a16:creationId xmlns:a16="http://schemas.microsoft.com/office/drawing/2014/main" id="{DCDDCB88-6764-A0BE-EB5B-B5363FC974E6}"/>
+              </a:ext>
+            </a:extLst>
+          </p:cNvPr>
+          <p:cNvPicPr>
+            <a:picLocks noChangeAspect="1"/>
+          </p:cNvPicPr>
+          <p:nvPr/>
+        </p:nvPicPr>
+        <p:blipFill>
+          <a:blip r:embed="rId3" cstate="print">
+            <a:extLst>
+              <a:ext uri="{28A0092B-C50C-407E-A947-70E740481C1C}">
+                <a14:useLocalDpi xmlns:a14="http://schemas.microsoft.com/office/drawing/2010/main" val="0"/>
+              </a:ext>
+            </a:extLst>
+          </a:blip>
+          <a:stretch>
+            <a:fillRect/>
+          </a:stretch>
+        </p:blipFill>
+        <p:spPr>
+          <a:xfrm>
+            <a:off x="5964822" y="396486"/>
+            <a:ext cx="3840203" cy="2880000"/>
+          </a:xfrm>
+          <a:prstGeom prst="rect">
+            <a:avLst/>
+          </a:prstGeom>
+        </p:spPr>
+      </p:pic>
+      <p:sp>
+        <p:nvSpPr>
+          <p:cNvPr id="12" name="TextBox 11">
+            <a:extLst>
+              <a:ext uri="{FF2B5EF4-FFF2-40B4-BE49-F238E27FC236}">
+                <a16:creationId xmlns:a16="http://schemas.microsoft.com/office/drawing/2014/main" id="{3810E69C-A35B-EDED-71AE-4D6FBCD548AC}"/>
+              </a:ext>
+            </a:extLst>
+          </p:cNvPr>
+          <p:cNvSpPr txBox="1"/>
+          <p:nvPr/>
+        </p:nvSpPr>
+        <p:spPr>
+          <a:xfrm>
+            <a:off x="10176387" y="1779077"/>
+            <a:ext cx="1443431" cy="646331"/>
+          </a:xfrm>
+          <a:prstGeom prst="rect">
+            <a:avLst/>
+          </a:prstGeom>
+          <a:noFill/>
+        </p:spPr>
+        <p:txBody>
+          <a:bodyPr wrap="square" rtlCol="0">
+            <a:spAutoFit/>
+          </a:bodyPr>
+          <a:lstStyle/>
+          <a:p>
+            <a:r>
+              <a:rPr lang="en-GB" i="1" dirty="0"/>
+              <a:t>(a) </a:t>
+            </a:r>
+            <a:r>
+              <a:rPr lang="en-GB" dirty="0"/>
+              <a:t>with ionisation</a:t>
+            </a:r>
+          </a:p>
+        </p:txBody>
+      </p:sp>
+      <p:sp>
+        <p:nvSpPr>
+          <p:cNvPr id="13" name="TextBox 12">
+            <a:extLst>
+              <a:ext uri="{FF2B5EF4-FFF2-40B4-BE49-F238E27FC236}">
+                <a16:creationId xmlns:a16="http://schemas.microsoft.com/office/drawing/2014/main" id="{27B7F33D-BED0-CD5E-A066-7F2E40D090A1}"/>
+              </a:ext>
+            </a:extLst>
+          </p:cNvPr>
+          <p:cNvSpPr txBox="1"/>
+          <p:nvPr/>
+        </p:nvSpPr>
+        <p:spPr>
+          <a:xfrm>
+            <a:off x="10176386" y="4304349"/>
+            <a:ext cx="1764031" cy="646331"/>
+          </a:xfrm>
+          <a:prstGeom prst="rect">
+            <a:avLst/>
+          </a:prstGeom>
+          <a:noFill/>
+        </p:spPr>
+        <p:txBody>
+          <a:bodyPr wrap="square" rtlCol="0">
+            <a:spAutoFit/>
+          </a:bodyPr>
+          <a:lstStyle/>
+          <a:p>
+            <a:r>
+              <a:rPr lang="en-GB" i="1" dirty="0"/>
+              <a:t>(b) </a:t>
+            </a:r>
+            <a:r>
+              <a:rPr lang="en-GB" dirty="0"/>
+              <a:t>without ionisation</a:t>
+            </a:r>
+          </a:p>
+        </p:txBody>
+      </p:sp>
+      <p:sp>
+        <p:nvSpPr>
+          <p:cNvPr id="14" name="TextBox 13">
+            <a:extLst>
+              <a:ext uri="{FF2B5EF4-FFF2-40B4-BE49-F238E27FC236}">
+                <a16:creationId xmlns:a16="http://schemas.microsoft.com/office/drawing/2014/main" id="{F518A628-EFAD-672B-CEF7-8217DE264C24}"/>
+              </a:ext>
+            </a:extLst>
+          </p:cNvPr>
+          <p:cNvSpPr txBox="1"/>
+          <p:nvPr/>
+        </p:nvSpPr>
+        <p:spPr>
+          <a:xfrm>
+            <a:off x="6198129" y="5815183"/>
+            <a:ext cx="5742289" cy="646331"/>
+          </a:xfrm>
+          <a:prstGeom prst="rect">
+            <a:avLst/>
+          </a:prstGeom>
+          <a:noFill/>
+        </p:spPr>
+        <p:txBody>
+          <a:bodyPr wrap="square" rtlCol="0">
+            <a:spAutoFit/>
+          </a:bodyPr>
+          <a:lstStyle/>
+          <a:p>
+            <a:r>
+              <a:rPr lang="en-GB" i="1" dirty="0"/>
+              <a:t>Fig. X</a:t>
+            </a:r>
+            <a:r>
+              <a:rPr lang="en-GB" dirty="0"/>
+              <a:t>: UV output beam profile with and without ionisation (Argon, 150mW, 0.4bar)</a:t>
+            </a:r>
+          </a:p>
+        </p:txBody>
+      </p:sp>
     </p:spTree>
     <p:extLst>
       <p:ext uri="{BB962C8B-B14F-4D97-AF65-F5344CB8AC3E}">
-        <p14:creationId xmlns:p14="http://schemas.microsoft.com/office/powerpoint/2010/main" val="4106140771"/>
+        <p14:creationId xmlns:p14="http://schemas.microsoft.com/office/powerpoint/2010/main" val="3297195848"/>
       </p:ext>
     </p:extLst>
   </p:cSld>

</xml_diff>